<commit_message>
feat: add new clauses and prints into `ComandosBásicos.pdf`
</commit_message>
<xml_diff>
--- a/Aula 03/ComandosBásicos.pptx
+++ b/Aula 03/ComandosBásicos.pptx
@@ -18,8 +18,14 @@
     <p:sldId id="266" r:id="rId12"/>
     <p:sldId id="267" r:id="rId13"/>
     <p:sldId id="268" r:id="rId14"/>
-    <p:sldId id="269" r:id="rId15"/>
-    <p:sldId id="271" r:id="rId16"/>
+    <p:sldId id="272" r:id="rId15"/>
+    <p:sldId id="273" r:id="rId16"/>
+    <p:sldId id="274" r:id="rId17"/>
+    <p:sldId id="275" r:id="rId18"/>
+    <p:sldId id="276" r:id="rId19"/>
+    <p:sldId id="277" r:id="rId20"/>
+    <p:sldId id="269" r:id="rId21"/>
+    <p:sldId id="271" r:id="rId22"/>
   </p:sldIdLst>
   <p:sldSz cx="12192000" cy="6858000"/>
   <p:notesSz cx="6858000" cy="9144000"/>
@@ -273,7 +279,7 @@
           <a:p>
             <a:fld id="{57FC07F7-71D6-4EB2-BB6B-DCE721D2C512}" type="datetimeFigureOut">
               <a:rPr lang="pt-BR" smtClean="0"/>
-              <a:t>10/02/2026</a:t>
+              <a:t>18/02/2026</a:t>
             </a:fld>
             <a:endParaRPr lang="pt-BR"/>
           </a:p>
@@ -471,7 +477,7 @@
           <a:p>
             <a:fld id="{57FC07F7-71D6-4EB2-BB6B-DCE721D2C512}" type="datetimeFigureOut">
               <a:rPr lang="pt-BR" smtClean="0"/>
-              <a:t>10/02/2026</a:t>
+              <a:t>18/02/2026</a:t>
             </a:fld>
             <a:endParaRPr lang="pt-BR"/>
           </a:p>
@@ -679,7 +685,7 @@
           <a:p>
             <a:fld id="{57FC07F7-71D6-4EB2-BB6B-DCE721D2C512}" type="datetimeFigureOut">
               <a:rPr lang="pt-BR" smtClean="0"/>
-              <a:t>10/02/2026</a:t>
+              <a:t>18/02/2026</a:t>
             </a:fld>
             <a:endParaRPr lang="pt-BR"/>
           </a:p>
@@ -877,7 +883,7 @@
           <a:p>
             <a:fld id="{57FC07F7-71D6-4EB2-BB6B-DCE721D2C512}" type="datetimeFigureOut">
               <a:rPr lang="pt-BR" smtClean="0"/>
-              <a:t>10/02/2026</a:t>
+              <a:t>18/02/2026</a:t>
             </a:fld>
             <a:endParaRPr lang="pt-BR"/>
           </a:p>
@@ -1152,7 +1158,7 @@
           <a:p>
             <a:fld id="{57FC07F7-71D6-4EB2-BB6B-DCE721D2C512}" type="datetimeFigureOut">
               <a:rPr lang="pt-BR" smtClean="0"/>
-              <a:t>10/02/2026</a:t>
+              <a:t>18/02/2026</a:t>
             </a:fld>
             <a:endParaRPr lang="pt-BR"/>
           </a:p>
@@ -1417,7 +1423,7 @@
           <a:p>
             <a:fld id="{57FC07F7-71D6-4EB2-BB6B-DCE721D2C512}" type="datetimeFigureOut">
               <a:rPr lang="pt-BR" smtClean="0"/>
-              <a:t>10/02/2026</a:t>
+              <a:t>18/02/2026</a:t>
             </a:fld>
             <a:endParaRPr lang="pt-BR"/>
           </a:p>
@@ -1829,7 +1835,7 @@
           <a:p>
             <a:fld id="{57FC07F7-71D6-4EB2-BB6B-DCE721D2C512}" type="datetimeFigureOut">
               <a:rPr lang="pt-BR" smtClean="0"/>
-              <a:t>10/02/2026</a:t>
+              <a:t>18/02/2026</a:t>
             </a:fld>
             <a:endParaRPr lang="pt-BR"/>
           </a:p>
@@ -1970,7 +1976,7 @@
           <a:p>
             <a:fld id="{57FC07F7-71D6-4EB2-BB6B-DCE721D2C512}" type="datetimeFigureOut">
               <a:rPr lang="pt-BR" smtClean="0"/>
-              <a:t>10/02/2026</a:t>
+              <a:t>18/02/2026</a:t>
             </a:fld>
             <a:endParaRPr lang="pt-BR"/>
           </a:p>
@@ -2083,7 +2089,7 @@
           <a:p>
             <a:fld id="{57FC07F7-71D6-4EB2-BB6B-DCE721D2C512}" type="datetimeFigureOut">
               <a:rPr lang="pt-BR" smtClean="0"/>
-              <a:t>10/02/2026</a:t>
+              <a:t>18/02/2026</a:t>
             </a:fld>
             <a:endParaRPr lang="pt-BR"/>
           </a:p>
@@ -2394,7 +2400,7 @@
           <a:p>
             <a:fld id="{57FC07F7-71D6-4EB2-BB6B-DCE721D2C512}" type="datetimeFigureOut">
               <a:rPr lang="pt-BR" smtClean="0"/>
-              <a:t>10/02/2026</a:t>
+              <a:t>18/02/2026</a:t>
             </a:fld>
             <a:endParaRPr lang="pt-BR"/>
           </a:p>
@@ -2682,7 +2688,7 @@
           <a:p>
             <a:fld id="{57FC07F7-71D6-4EB2-BB6B-DCE721D2C512}" type="datetimeFigureOut">
               <a:rPr lang="pt-BR" smtClean="0"/>
-              <a:t>10/02/2026</a:t>
+              <a:t>18/02/2026</a:t>
             </a:fld>
             <a:endParaRPr lang="pt-BR"/>
           </a:p>
@@ -2923,7 +2929,7 @@
           <a:p>
             <a:fld id="{57FC07F7-71D6-4EB2-BB6B-DCE721D2C512}" type="datetimeFigureOut">
               <a:rPr lang="pt-BR" smtClean="0"/>
-              <a:t>10/02/2026</a:t>
+              <a:t>18/02/2026</a:t>
             </a:fld>
             <a:endParaRPr lang="pt-BR"/>
           </a:p>
@@ -3611,114 +3617,6 @@
           </a:prstGeom>
         </p:spPr>
       </p:pic>
-      <p:sp>
-        <p:nvSpPr>
-          <p:cNvPr id="2" name="CaixaDeTexto 1">
-            <a:extLst>
-              <a:ext uri="{FF2B5EF4-FFF2-40B4-BE49-F238E27FC236}">
-                <a16:creationId xmlns:a16="http://schemas.microsoft.com/office/drawing/2014/main" id="{49B49727-DD10-3661-8913-F57F75EBC30D}"/>
-              </a:ext>
-            </a:extLst>
-          </p:cNvPr>
-          <p:cNvSpPr txBox="1"/>
-          <p:nvPr/>
-        </p:nvSpPr>
-        <p:spPr>
-          <a:xfrm>
-            <a:off x="4500974" y="180011"/>
-            <a:ext cx="3190051" cy="646331"/>
-          </a:xfrm>
-          <a:prstGeom prst="rect">
-            <a:avLst/>
-          </a:prstGeom>
-          <a:noFill/>
-        </p:spPr>
-        <p:txBody>
-          <a:bodyPr wrap="square" rtlCol="0">
-            <a:spAutoFit/>
-          </a:bodyPr>
-          <a:lstStyle/>
-          <a:p>
-            <a:r>
-              <a:rPr lang="en-US" sz="3600" dirty="0"/>
-              <a:t>Busca de Dados</a:t>
-            </a:r>
-            <a:endParaRPr lang="pt-BR" sz="3600" dirty="0"/>
-          </a:p>
-        </p:txBody>
-      </p:sp>
-      <p:sp>
-        <p:nvSpPr>
-          <p:cNvPr id="3" name="CaixaDeTexto 2">
-            <a:extLst>
-              <a:ext uri="{FF2B5EF4-FFF2-40B4-BE49-F238E27FC236}">
-                <a16:creationId xmlns:a16="http://schemas.microsoft.com/office/drawing/2014/main" id="{E8C6A7CB-2CB3-857F-C932-B83281BA7E83}"/>
-              </a:ext>
-            </a:extLst>
-          </p:cNvPr>
-          <p:cNvSpPr txBox="1"/>
-          <p:nvPr/>
-        </p:nvSpPr>
-        <p:spPr>
-          <a:xfrm>
-            <a:off x="1219254" y="1357243"/>
-            <a:ext cx="9753490" cy="523220"/>
-          </a:xfrm>
-          <a:prstGeom prst="rect">
-            <a:avLst/>
-          </a:prstGeom>
-          <a:noFill/>
-        </p:spPr>
-        <p:txBody>
-          <a:bodyPr wrap="square" rtlCol="0">
-            <a:spAutoFit/>
-          </a:bodyPr>
-          <a:lstStyle/>
-          <a:p>
-            <a:r>
-              <a:rPr lang="en-US" sz="2800" dirty="0" err="1"/>
-              <a:t>Buscando</a:t>
-            </a:r>
-            <a:r>
-              <a:rPr lang="en-US" sz="2800" dirty="0"/>
-              <a:t> </a:t>
-            </a:r>
-            <a:r>
-              <a:rPr lang="en-US" sz="2800" dirty="0" err="1"/>
-              <a:t>parte</a:t>
-            </a:r>
-            <a:r>
-              <a:rPr lang="en-US" sz="2800" dirty="0"/>
-              <a:t> dos dados de </a:t>
-            </a:r>
-            <a:r>
-              <a:rPr lang="en-US" sz="2800" dirty="0" err="1"/>
-              <a:t>uma</a:t>
-            </a:r>
-            <a:r>
-              <a:rPr lang="en-US" sz="2800" dirty="0"/>
-              <a:t> </a:t>
-            </a:r>
-            <a:r>
-              <a:rPr lang="en-US" sz="2800" dirty="0" err="1"/>
-              <a:t>tabela</a:t>
-            </a:r>
-            <a:r>
-              <a:rPr lang="en-US" sz="2800" dirty="0"/>
-              <a:t> com </a:t>
-            </a:r>
-            <a:r>
-              <a:rPr lang="en-US" sz="2800" dirty="0" err="1"/>
-              <a:t>lógicas</a:t>
-            </a:r>
-            <a:r>
-              <a:rPr lang="en-US" sz="2800" dirty="0"/>
-              <a:t> AND  e NOT</a:t>
-            </a:r>
-            <a:endParaRPr lang="pt-BR" sz="2800" dirty="0"/>
-          </a:p>
-        </p:txBody>
-      </p:sp>
       <p:pic>
         <p:nvPicPr>
           <p:cNvPr id="8" name="Imagem 7">
@@ -3751,10 +3649,10 @@
       </p:pic>
       <p:pic>
         <p:nvPicPr>
-          <p:cNvPr id="7" name="Imagem 6">
-            <a:extLst>
-              <a:ext uri="{FF2B5EF4-FFF2-40B4-BE49-F238E27FC236}">
-                <a16:creationId xmlns:a16="http://schemas.microsoft.com/office/drawing/2014/main" id="{B15B4459-04C1-221D-FE68-00E916DD24A4}"/>
+          <p:cNvPr id="6" name="Imagem 5">
+            <a:extLst>
+              <a:ext uri="{FF2B5EF4-FFF2-40B4-BE49-F238E27FC236}">
+                <a16:creationId xmlns:a16="http://schemas.microsoft.com/office/drawing/2014/main" id="{D35FEFEB-D384-17DB-0490-00399308D7ED}"/>
               </a:ext>
             </a:extLst>
           </p:cNvPr>
@@ -3764,21 +3662,67 @@
           <p:nvPr/>
         </p:nvPicPr>
         <p:blipFill>
-          <a:blip r:embed="rId4"/>
+          <a:blip r:embed="rId4">
+            <a:extLst>
+              <a:ext uri="{28A0092B-C50C-407E-A947-70E740481C1C}">
+                <a14:useLocalDpi xmlns:a14="http://schemas.microsoft.com/office/drawing/2010/main" val="0"/>
+              </a:ext>
+            </a:extLst>
+          </a:blip>
           <a:stretch>
             <a:fillRect/>
           </a:stretch>
         </p:blipFill>
         <p:spPr>
           <a:xfrm>
-            <a:off x="627886" y="2529231"/>
-            <a:ext cx="10936226" cy="390580"/>
+            <a:off x="818917" y="1113168"/>
+            <a:ext cx="10554165" cy="1999470"/>
           </a:xfrm>
           <a:prstGeom prst="rect">
             <a:avLst/>
           </a:prstGeom>
         </p:spPr>
       </p:pic>
+      <p:sp>
+        <p:nvSpPr>
+          <p:cNvPr id="9" name="CaixaDeTexto 8">
+            <a:extLst>
+              <a:ext uri="{FF2B5EF4-FFF2-40B4-BE49-F238E27FC236}">
+                <a16:creationId xmlns:a16="http://schemas.microsoft.com/office/drawing/2014/main" id="{94BA5272-6F74-190A-D904-5DD78B3A8F82}"/>
+              </a:ext>
+            </a:extLst>
+          </p:cNvPr>
+          <p:cNvSpPr txBox="1"/>
+          <p:nvPr/>
+        </p:nvSpPr>
+        <p:spPr>
+          <a:xfrm>
+            <a:off x="4353749" y="180011"/>
+            <a:ext cx="3484502" cy="646331"/>
+          </a:xfrm>
+          <a:prstGeom prst="rect">
+            <a:avLst/>
+          </a:prstGeom>
+          <a:noFill/>
+        </p:spPr>
+        <p:txBody>
+          <a:bodyPr wrap="square" rtlCol="0">
+            <a:spAutoFit/>
+          </a:bodyPr>
+          <a:lstStyle/>
+          <a:p>
+            <a:r>
+              <a:rPr lang="en-US" sz="3600" dirty="0" err="1"/>
+              <a:t>Comando</a:t>
+            </a:r>
+            <a:r>
+              <a:rPr lang="en-US" sz="3600" dirty="0"/>
+              <a:t> SELECT</a:t>
+            </a:r>
+            <a:endParaRPr lang="pt-BR" sz="3600" dirty="0"/>
+          </a:p>
+        </p:txBody>
+      </p:sp>
     </p:spTree>
     <p:extLst>
       <p:ext uri="{BB962C8B-B14F-4D97-AF65-F5344CB8AC3E}">
@@ -3851,132 +3795,12 @@
           </a:prstGeom>
         </p:spPr>
       </p:pic>
-      <p:sp>
-        <p:nvSpPr>
-          <p:cNvPr id="2" name="CaixaDeTexto 1">
-            <a:extLst>
-              <a:ext uri="{FF2B5EF4-FFF2-40B4-BE49-F238E27FC236}">
-                <a16:creationId xmlns:a16="http://schemas.microsoft.com/office/drawing/2014/main" id="{D1639AFE-94B8-9597-A1A0-2B2CC7FB5B3F}"/>
-              </a:ext>
-            </a:extLst>
-          </p:cNvPr>
-          <p:cNvSpPr txBox="1"/>
-          <p:nvPr/>
-        </p:nvSpPr>
-        <p:spPr>
-          <a:xfrm>
-            <a:off x="4500974" y="180011"/>
-            <a:ext cx="3190051" cy="646331"/>
-          </a:xfrm>
-          <a:prstGeom prst="rect">
-            <a:avLst/>
-          </a:prstGeom>
-          <a:noFill/>
-        </p:spPr>
-        <p:txBody>
-          <a:bodyPr wrap="square" rtlCol="0">
-            <a:spAutoFit/>
-          </a:bodyPr>
-          <a:lstStyle/>
-          <a:p>
-            <a:r>
-              <a:rPr lang="en-US" sz="3600" dirty="0"/>
-              <a:t>Busca de Dados</a:t>
-            </a:r>
-            <a:endParaRPr lang="pt-BR" sz="3600" dirty="0"/>
-          </a:p>
-        </p:txBody>
-      </p:sp>
-      <p:sp>
-        <p:nvSpPr>
-          <p:cNvPr id="3" name="CaixaDeTexto 2">
-            <a:extLst>
-              <a:ext uri="{FF2B5EF4-FFF2-40B4-BE49-F238E27FC236}">
-                <a16:creationId xmlns:a16="http://schemas.microsoft.com/office/drawing/2014/main" id="{52D2C8DF-7424-CE79-C99D-46ABCE57A30D}"/>
-              </a:ext>
-            </a:extLst>
-          </p:cNvPr>
-          <p:cNvSpPr txBox="1"/>
-          <p:nvPr/>
-        </p:nvSpPr>
-        <p:spPr>
-          <a:xfrm>
-            <a:off x="1721318" y="1286399"/>
-            <a:ext cx="8749359" cy="523220"/>
-          </a:xfrm>
-          <a:prstGeom prst="rect">
-            <a:avLst/>
-          </a:prstGeom>
-          <a:noFill/>
-        </p:spPr>
-        <p:txBody>
-          <a:bodyPr wrap="square" rtlCol="0">
-            <a:spAutoFit/>
-          </a:bodyPr>
-          <a:lstStyle/>
-          <a:p>
-            <a:r>
-              <a:rPr lang="en-US" sz="2800" dirty="0" err="1"/>
-              <a:t>Buscando</a:t>
-            </a:r>
-            <a:r>
-              <a:rPr lang="en-US" sz="2800" dirty="0"/>
-              <a:t> </a:t>
-            </a:r>
-            <a:r>
-              <a:rPr lang="en-US" sz="2800" dirty="0" err="1"/>
-              <a:t>todos</a:t>
-            </a:r>
-            <a:r>
-              <a:rPr lang="en-US" sz="2800" dirty="0"/>
-              <a:t> </a:t>
-            </a:r>
-            <a:r>
-              <a:rPr lang="en-US" sz="2800" dirty="0" err="1"/>
-              <a:t>os</a:t>
-            </a:r>
-            <a:r>
-              <a:rPr lang="en-US" sz="2800" dirty="0"/>
-              <a:t> dados de </a:t>
-            </a:r>
-            <a:r>
-              <a:rPr lang="en-US" sz="2800" dirty="0" err="1"/>
-              <a:t>uma</a:t>
-            </a:r>
-            <a:r>
-              <a:rPr lang="en-US" sz="2800" dirty="0"/>
-              <a:t> </a:t>
-            </a:r>
-            <a:r>
-              <a:rPr lang="en-US" sz="2800" dirty="0" err="1"/>
-              <a:t>tabela</a:t>
-            </a:r>
-            <a:r>
-              <a:rPr lang="en-US" sz="2800" dirty="0"/>
-              <a:t> com </a:t>
-            </a:r>
-            <a:r>
-              <a:rPr lang="en-US" sz="2800" dirty="0" err="1"/>
-              <a:t>filtro</a:t>
-            </a:r>
-            <a:r>
-              <a:rPr lang="en-US" sz="2800" dirty="0"/>
-              <a:t> de </a:t>
-            </a:r>
-            <a:r>
-              <a:rPr lang="en-US" sz="2800" dirty="0" err="1"/>
-              <a:t>texto</a:t>
-            </a:r>
-            <a:endParaRPr lang="pt-BR" sz="2800" dirty="0"/>
-          </a:p>
-        </p:txBody>
-      </p:sp>
       <p:pic>
         <p:nvPicPr>
-          <p:cNvPr id="6" name="Imagem 5">
-            <a:extLst>
-              <a:ext uri="{FF2B5EF4-FFF2-40B4-BE49-F238E27FC236}">
-                <a16:creationId xmlns:a16="http://schemas.microsoft.com/office/drawing/2014/main" id="{491FD637-7DDD-97DA-9AE2-213D35FC2121}"/>
+          <p:cNvPr id="8" name="Imagem 7">
+            <a:extLst>
+              <a:ext uri="{FF2B5EF4-FFF2-40B4-BE49-F238E27FC236}">
+                <a16:creationId xmlns:a16="http://schemas.microsoft.com/office/drawing/2014/main" id="{67EEED55-12EB-B4B4-5B30-20F2C1B918EB}"/>
               </a:ext>
             </a:extLst>
           </p:cNvPr>
@@ -3993,8 +3817,8 @@
         </p:blipFill>
         <p:spPr>
           <a:xfrm>
-            <a:off x="399620" y="2112741"/>
-            <a:ext cx="11392756" cy="1844061"/>
+            <a:off x="697171" y="4420420"/>
+            <a:ext cx="5029902" cy="828791"/>
           </a:xfrm>
           <a:prstGeom prst="rect">
             <a:avLst/>
@@ -4003,10 +3827,10 @@
       </p:pic>
       <p:pic>
         <p:nvPicPr>
-          <p:cNvPr id="8" name="Imagem 7">
-            <a:extLst>
-              <a:ext uri="{FF2B5EF4-FFF2-40B4-BE49-F238E27FC236}">
-                <a16:creationId xmlns:a16="http://schemas.microsoft.com/office/drawing/2014/main" id="{67EEED55-12EB-B4B4-5B30-20F2C1B918EB}"/>
+          <p:cNvPr id="10" name="Imagem 9">
+            <a:extLst>
+              <a:ext uri="{FF2B5EF4-FFF2-40B4-BE49-F238E27FC236}">
+                <a16:creationId xmlns:a16="http://schemas.microsoft.com/office/drawing/2014/main" id="{1A9D9BDD-3C6A-9CA1-7B56-7D9331F7BB89}"/>
               </a:ext>
             </a:extLst>
           </p:cNvPr>
@@ -4023,8 +3847,8 @@
         </p:blipFill>
         <p:spPr>
           <a:xfrm>
-            <a:off x="697171" y="4420420"/>
-            <a:ext cx="5029902" cy="828791"/>
+            <a:off x="6424244" y="4420420"/>
+            <a:ext cx="4629796" cy="628738"/>
           </a:xfrm>
           <a:prstGeom prst="rect">
             <a:avLst/>
@@ -4033,10 +3857,10 @@
       </p:pic>
       <p:pic>
         <p:nvPicPr>
-          <p:cNvPr id="10" name="Imagem 9">
-            <a:extLst>
-              <a:ext uri="{FF2B5EF4-FFF2-40B4-BE49-F238E27FC236}">
-                <a16:creationId xmlns:a16="http://schemas.microsoft.com/office/drawing/2014/main" id="{1A9D9BDD-3C6A-9CA1-7B56-7D9331F7BB89}"/>
+          <p:cNvPr id="12" name="Imagem 11">
+            <a:extLst>
+              <a:ext uri="{FF2B5EF4-FFF2-40B4-BE49-F238E27FC236}">
+                <a16:creationId xmlns:a16="http://schemas.microsoft.com/office/drawing/2014/main" id="{97419711-9FFB-2226-F0AF-670AC5238F4C}"/>
               </a:ext>
             </a:extLst>
           </p:cNvPr>
@@ -4053,8 +3877,8 @@
         </p:blipFill>
         <p:spPr>
           <a:xfrm>
-            <a:off x="6424244" y="4420420"/>
-            <a:ext cx="4629796" cy="628738"/>
+            <a:off x="697171" y="5709268"/>
+            <a:ext cx="4643513" cy="441772"/>
           </a:xfrm>
           <a:prstGeom prst="rect">
             <a:avLst/>
@@ -4063,10 +3887,10 @@
       </p:pic>
       <p:pic>
         <p:nvPicPr>
-          <p:cNvPr id="12" name="Imagem 11">
-            <a:extLst>
-              <a:ext uri="{FF2B5EF4-FFF2-40B4-BE49-F238E27FC236}">
-                <a16:creationId xmlns:a16="http://schemas.microsoft.com/office/drawing/2014/main" id="{97419711-9FFB-2226-F0AF-670AC5238F4C}"/>
+          <p:cNvPr id="14" name="Imagem 13">
+            <a:extLst>
+              <a:ext uri="{FF2B5EF4-FFF2-40B4-BE49-F238E27FC236}">
+                <a16:creationId xmlns:a16="http://schemas.microsoft.com/office/drawing/2014/main" id="{6F358BF3-207B-1813-6E75-C6C51B6E8ED3}"/>
               </a:ext>
             </a:extLst>
           </p:cNvPr>
@@ -4083,20 +3907,60 @@
         </p:blipFill>
         <p:spPr>
           <a:xfrm>
-            <a:off x="697171" y="5709268"/>
-            <a:ext cx="4643513" cy="441772"/>
+            <a:off x="6288689" y="5512776"/>
+            <a:ext cx="4991797" cy="638264"/>
           </a:xfrm>
           <a:prstGeom prst="rect">
             <a:avLst/>
           </a:prstGeom>
         </p:spPr>
       </p:pic>
+      <p:sp>
+        <p:nvSpPr>
+          <p:cNvPr id="4" name="CaixaDeTexto 3">
+            <a:extLst>
+              <a:ext uri="{FF2B5EF4-FFF2-40B4-BE49-F238E27FC236}">
+                <a16:creationId xmlns:a16="http://schemas.microsoft.com/office/drawing/2014/main" id="{666C145F-89B5-7B0F-B726-197E9AC12556}"/>
+              </a:ext>
+            </a:extLst>
+          </p:cNvPr>
+          <p:cNvSpPr txBox="1"/>
+          <p:nvPr/>
+        </p:nvSpPr>
+        <p:spPr>
+          <a:xfrm>
+            <a:off x="4353749" y="180011"/>
+            <a:ext cx="3484502" cy="646331"/>
+          </a:xfrm>
+          <a:prstGeom prst="rect">
+            <a:avLst/>
+          </a:prstGeom>
+          <a:noFill/>
+        </p:spPr>
+        <p:txBody>
+          <a:bodyPr wrap="square" rtlCol="0">
+            <a:spAutoFit/>
+          </a:bodyPr>
+          <a:lstStyle/>
+          <a:p>
+            <a:r>
+              <a:rPr lang="en-US" sz="3600" dirty="0" err="1"/>
+              <a:t>Comando</a:t>
+            </a:r>
+            <a:r>
+              <a:rPr lang="en-US" sz="3600" dirty="0"/>
+              <a:t> SELECT</a:t>
+            </a:r>
+            <a:endParaRPr lang="pt-BR" sz="3600" dirty="0"/>
+          </a:p>
+        </p:txBody>
+      </p:sp>
       <p:pic>
         <p:nvPicPr>
-          <p:cNvPr id="14" name="Imagem 13">
-            <a:extLst>
-              <a:ext uri="{FF2B5EF4-FFF2-40B4-BE49-F238E27FC236}">
-                <a16:creationId xmlns:a16="http://schemas.microsoft.com/office/drawing/2014/main" id="{6F358BF3-207B-1813-6E75-C6C51B6E8ED3}"/>
+          <p:cNvPr id="9" name="Imagem 8">
+            <a:extLst>
+              <a:ext uri="{FF2B5EF4-FFF2-40B4-BE49-F238E27FC236}">
+                <a16:creationId xmlns:a16="http://schemas.microsoft.com/office/drawing/2014/main" id="{7AF7CAB1-F922-96E0-A16C-1131AE4E82FC}"/>
               </a:ext>
             </a:extLst>
           </p:cNvPr>
@@ -4106,15 +3970,21 @@
           <p:nvPr/>
         </p:nvPicPr>
         <p:blipFill>
-          <a:blip r:embed="rId7"/>
+          <a:blip r:embed="rId7">
+            <a:extLst>
+              <a:ext uri="{28A0092B-C50C-407E-A947-70E740481C1C}">
+                <a14:useLocalDpi xmlns:a14="http://schemas.microsoft.com/office/drawing/2010/main" val="0"/>
+              </a:ext>
+            </a:extLst>
+          </a:blip>
           <a:stretch>
             <a:fillRect/>
           </a:stretch>
         </p:blipFill>
         <p:spPr>
           <a:xfrm>
-            <a:off x="6288689" y="5512776"/>
-            <a:ext cx="4991797" cy="638264"/>
+            <a:off x="1089914" y="1006628"/>
+            <a:ext cx="10012172" cy="2981741"/>
           </a:xfrm>
           <a:prstGeom prst="rect">
             <a:avLst/>
@@ -4193,110 +4063,6 @@
           </a:prstGeom>
         </p:spPr>
       </p:pic>
-      <p:sp>
-        <p:nvSpPr>
-          <p:cNvPr id="3" name="CaixaDeTexto 2">
-            <a:extLst>
-              <a:ext uri="{FF2B5EF4-FFF2-40B4-BE49-F238E27FC236}">
-                <a16:creationId xmlns:a16="http://schemas.microsoft.com/office/drawing/2014/main" id="{E43B6FF9-D304-B26A-BFD7-C7EFD37CB544}"/>
-              </a:ext>
-            </a:extLst>
-          </p:cNvPr>
-          <p:cNvSpPr txBox="1"/>
-          <p:nvPr/>
-        </p:nvSpPr>
-        <p:spPr>
-          <a:xfrm>
-            <a:off x="4500974" y="180011"/>
-            <a:ext cx="3190051" cy="646331"/>
-          </a:xfrm>
-          <a:prstGeom prst="rect">
-            <a:avLst/>
-          </a:prstGeom>
-          <a:noFill/>
-        </p:spPr>
-        <p:txBody>
-          <a:bodyPr wrap="square" rtlCol="0">
-            <a:spAutoFit/>
-          </a:bodyPr>
-          <a:lstStyle/>
-          <a:p>
-            <a:r>
-              <a:rPr lang="en-US" sz="3600" dirty="0"/>
-              <a:t>Busca de Dados</a:t>
-            </a:r>
-            <a:endParaRPr lang="pt-BR" sz="3600" dirty="0"/>
-          </a:p>
-        </p:txBody>
-      </p:sp>
-      <p:sp>
-        <p:nvSpPr>
-          <p:cNvPr id="4" name="CaixaDeTexto 3">
-            <a:extLst>
-              <a:ext uri="{FF2B5EF4-FFF2-40B4-BE49-F238E27FC236}">
-                <a16:creationId xmlns:a16="http://schemas.microsoft.com/office/drawing/2014/main" id="{671B1B58-8D2D-32BB-5A03-A19AD25FAF4C}"/>
-              </a:ext>
-            </a:extLst>
-          </p:cNvPr>
-          <p:cNvSpPr txBox="1"/>
-          <p:nvPr/>
-        </p:nvSpPr>
-        <p:spPr>
-          <a:xfrm>
-            <a:off x="2226924" y="1336431"/>
-            <a:ext cx="7738150" cy="523220"/>
-          </a:xfrm>
-          <a:prstGeom prst="rect">
-            <a:avLst/>
-          </a:prstGeom>
-          <a:noFill/>
-        </p:spPr>
-        <p:txBody>
-          <a:bodyPr wrap="square" rtlCol="0">
-            <a:spAutoFit/>
-          </a:bodyPr>
-          <a:lstStyle/>
-          <a:p>
-            <a:r>
-              <a:rPr lang="en-US" sz="2800" dirty="0" err="1"/>
-              <a:t>Buscando</a:t>
-            </a:r>
-            <a:r>
-              <a:rPr lang="en-US" sz="2800" dirty="0"/>
-              <a:t> </a:t>
-            </a:r>
-            <a:r>
-              <a:rPr lang="en-US" sz="2800" dirty="0" err="1"/>
-              <a:t>parte</a:t>
-            </a:r>
-            <a:r>
-              <a:rPr lang="en-US" sz="2800" dirty="0"/>
-              <a:t> dos dados de </a:t>
-            </a:r>
-            <a:r>
-              <a:rPr lang="en-US" sz="2800" dirty="0" err="1"/>
-              <a:t>uma</a:t>
-            </a:r>
-            <a:r>
-              <a:rPr lang="en-US" sz="2800" dirty="0"/>
-              <a:t> </a:t>
-            </a:r>
-            <a:r>
-              <a:rPr lang="en-US" sz="2800" dirty="0" err="1"/>
-              <a:t>tabela</a:t>
-            </a:r>
-            <a:r>
-              <a:rPr lang="en-US" sz="2800" dirty="0"/>
-              <a:t> com </a:t>
-            </a:r>
-            <a:r>
-              <a:rPr lang="en-US" sz="2800" dirty="0" err="1"/>
-              <a:t>limite</a:t>
-            </a:r>
-            <a:endParaRPr lang="pt-BR" sz="2800" dirty="0"/>
-          </a:p>
-        </p:txBody>
-      </p:sp>
       <p:pic>
         <p:nvPicPr>
           <p:cNvPr id="9" name="Imagem 8">
@@ -4327,12 +4093,52 @@
           </a:prstGeom>
         </p:spPr>
       </p:pic>
+      <p:sp>
+        <p:nvSpPr>
+          <p:cNvPr id="2" name="CaixaDeTexto 1">
+            <a:extLst>
+              <a:ext uri="{FF2B5EF4-FFF2-40B4-BE49-F238E27FC236}">
+                <a16:creationId xmlns:a16="http://schemas.microsoft.com/office/drawing/2014/main" id="{2D52EF78-6CA3-A9D3-446A-BABE13A8F9C0}"/>
+              </a:ext>
+            </a:extLst>
+          </p:cNvPr>
+          <p:cNvSpPr txBox="1"/>
+          <p:nvPr/>
+        </p:nvSpPr>
+        <p:spPr>
+          <a:xfrm>
+            <a:off x="4353749" y="180011"/>
+            <a:ext cx="3484502" cy="646331"/>
+          </a:xfrm>
+          <a:prstGeom prst="rect">
+            <a:avLst/>
+          </a:prstGeom>
+          <a:noFill/>
+        </p:spPr>
+        <p:txBody>
+          <a:bodyPr wrap="square" rtlCol="0">
+            <a:spAutoFit/>
+          </a:bodyPr>
+          <a:lstStyle/>
+          <a:p>
+            <a:r>
+              <a:rPr lang="en-US" sz="3600" dirty="0" err="1"/>
+              <a:t>Comando</a:t>
+            </a:r>
+            <a:r>
+              <a:rPr lang="en-US" sz="3600" dirty="0"/>
+              <a:t> SELECT</a:t>
+            </a:r>
+            <a:endParaRPr lang="pt-BR" sz="3600" dirty="0"/>
+          </a:p>
+        </p:txBody>
+      </p:sp>
       <p:pic>
         <p:nvPicPr>
-          <p:cNvPr id="6" name="Imagem 5">
-            <a:extLst>
-              <a:ext uri="{FF2B5EF4-FFF2-40B4-BE49-F238E27FC236}">
-                <a16:creationId xmlns:a16="http://schemas.microsoft.com/office/drawing/2014/main" id="{2CE24881-FE20-794E-4B73-7D8E9B358D6A}"/>
+          <p:cNvPr id="8" name="Imagem 7">
+            <a:extLst>
+              <a:ext uri="{FF2B5EF4-FFF2-40B4-BE49-F238E27FC236}">
+                <a16:creationId xmlns:a16="http://schemas.microsoft.com/office/drawing/2014/main" id="{269C737D-DAB0-7756-726B-121C2D98DBF5}"/>
               </a:ext>
             </a:extLst>
           </p:cNvPr>
@@ -4342,15 +4148,21 @@
           <p:nvPr/>
         </p:nvPicPr>
         <p:blipFill>
-          <a:blip r:embed="rId4"/>
+          <a:blip r:embed="rId4">
+            <a:extLst>
+              <a:ext uri="{28A0092B-C50C-407E-A947-70E740481C1C}">
+                <a14:useLocalDpi xmlns:a14="http://schemas.microsoft.com/office/drawing/2010/main" val="0"/>
+              </a:ext>
+            </a:extLst>
+          </a:blip>
           <a:stretch>
             <a:fillRect/>
           </a:stretch>
         </p:blipFill>
         <p:spPr>
           <a:xfrm>
-            <a:off x="1029492" y="2310850"/>
-            <a:ext cx="10133014" cy="619645"/>
+            <a:off x="433752" y="1289126"/>
+            <a:ext cx="11324492" cy="1666592"/>
           </a:xfrm>
           <a:prstGeom prst="rect">
             <a:avLst/>
@@ -4429,110 +4241,6 @@
           </a:prstGeom>
         </p:spPr>
       </p:pic>
-      <p:sp>
-        <p:nvSpPr>
-          <p:cNvPr id="2" name="CaixaDeTexto 1">
-            <a:extLst>
-              <a:ext uri="{FF2B5EF4-FFF2-40B4-BE49-F238E27FC236}">
-                <a16:creationId xmlns:a16="http://schemas.microsoft.com/office/drawing/2014/main" id="{806FC76A-1C82-88ED-B714-62049325ACC2}"/>
-              </a:ext>
-            </a:extLst>
-          </p:cNvPr>
-          <p:cNvSpPr txBox="1"/>
-          <p:nvPr/>
-        </p:nvSpPr>
-        <p:spPr>
-          <a:xfrm>
-            <a:off x="4500974" y="180011"/>
-            <a:ext cx="3190051" cy="646331"/>
-          </a:xfrm>
-          <a:prstGeom prst="rect">
-            <a:avLst/>
-          </a:prstGeom>
-          <a:noFill/>
-        </p:spPr>
-        <p:txBody>
-          <a:bodyPr wrap="square" rtlCol="0">
-            <a:spAutoFit/>
-          </a:bodyPr>
-          <a:lstStyle/>
-          <a:p>
-            <a:r>
-              <a:rPr lang="en-US" sz="3600" dirty="0"/>
-              <a:t>Busca de Dados</a:t>
-            </a:r>
-            <a:endParaRPr lang="pt-BR" sz="3600" dirty="0"/>
-          </a:p>
-        </p:txBody>
-      </p:sp>
-      <p:sp>
-        <p:nvSpPr>
-          <p:cNvPr id="3" name="CaixaDeTexto 2">
-            <a:extLst>
-              <a:ext uri="{FF2B5EF4-FFF2-40B4-BE49-F238E27FC236}">
-                <a16:creationId xmlns:a16="http://schemas.microsoft.com/office/drawing/2014/main" id="{F6A873F4-FE56-1445-9AF9-11E9527B1D07}"/>
-              </a:ext>
-            </a:extLst>
-          </p:cNvPr>
-          <p:cNvSpPr txBox="1"/>
-          <p:nvPr/>
-        </p:nvSpPr>
-        <p:spPr>
-          <a:xfrm>
-            <a:off x="3005208" y="1296860"/>
-            <a:ext cx="6181578" cy="523220"/>
-          </a:xfrm>
-          <a:prstGeom prst="rect">
-            <a:avLst/>
-          </a:prstGeom>
-          <a:noFill/>
-        </p:spPr>
-        <p:txBody>
-          <a:bodyPr wrap="square" rtlCol="0">
-            <a:spAutoFit/>
-          </a:bodyPr>
-          <a:lstStyle/>
-          <a:p>
-            <a:r>
-              <a:rPr lang="en-US" sz="2800" dirty="0" err="1"/>
-              <a:t>Buscando</a:t>
-            </a:r>
-            <a:r>
-              <a:rPr lang="en-US" sz="2800" dirty="0"/>
-              <a:t> </a:t>
-            </a:r>
-            <a:r>
-              <a:rPr lang="en-US" sz="2800" dirty="0" err="1"/>
-              <a:t>todos</a:t>
-            </a:r>
-            <a:r>
-              <a:rPr lang="en-US" sz="2800" dirty="0"/>
-              <a:t> </a:t>
-            </a:r>
-            <a:r>
-              <a:rPr lang="en-US" sz="2800" dirty="0" err="1"/>
-              <a:t>os</a:t>
-            </a:r>
-            <a:r>
-              <a:rPr lang="en-US" sz="2800" dirty="0"/>
-              <a:t> dados </a:t>
-            </a:r>
-            <a:r>
-              <a:rPr lang="en-US" sz="2800" dirty="0" err="1"/>
-              <a:t>sem</a:t>
-            </a:r>
-            <a:r>
-              <a:rPr lang="en-US" sz="2800" dirty="0"/>
-              <a:t> </a:t>
-            </a:r>
-            <a:r>
-              <a:rPr lang="en-US" sz="2800" dirty="0" err="1"/>
-              <a:t>repetições</a:t>
-            </a:r>
-            <a:endParaRPr lang="pt-BR" sz="2800" dirty="0"/>
-          </a:p>
-        </p:txBody>
-      </p:sp>
       <p:pic>
         <p:nvPicPr>
           <p:cNvPr id="8" name="Imagem 7">
@@ -4563,12 +4271,52 @@
           </a:prstGeom>
         </p:spPr>
       </p:pic>
+      <p:sp>
+        <p:nvSpPr>
+          <p:cNvPr id="4" name="CaixaDeTexto 3">
+            <a:extLst>
+              <a:ext uri="{FF2B5EF4-FFF2-40B4-BE49-F238E27FC236}">
+                <a16:creationId xmlns:a16="http://schemas.microsoft.com/office/drawing/2014/main" id="{6754D52F-02D2-EFD2-F364-AF9C75544768}"/>
+              </a:ext>
+            </a:extLst>
+          </p:cNvPr>
+          <p:cNvSpPr txBox="1"/>
+          <p:nvPr/>
+        </p:nvSpPr>
+        <p:spPr>
+          <a:xfrm>
+            <a:off x="4353749" y="180011"/>
+            <a:ext cx="3484502" cy="646331"/>
+          </a:xfrm>
+          <a:prstGeom prst="rect">
+            <a:avLst/>
+          </a:prstGeom>
+          <a:noFill/>
+        </p:spPr>
+        <p:txBody>
+          <a:bodyPr wrap="square" rtlCol="0">
+            <a:spAutoFit/>
+          </a:bodyPr>
+          <a:lstStyle/>
+          <a:p>
+            <a:r>
+              <a:rPr lang="en-US" sz="3600" dirty="0" err="1"/>
+              <a:t>Comando</a:t>
+            </a:r>
+            <a:r>
+              <a:rPr lang="en-US" sz="3600" dirty="0"/>
+              <a:t> SELECT</a:t>
+            </a:r>
+            <a:endParaRPr lang="pt-BR" sz="3600" dirty="0"/>
+          </a:p>
+        </p:txBody>
+      </p:sp>
       <p:pic>
         <p:nvPicPr>
-          <p:cNvPr id="7" name="Imagem 6">
-            <a:extLst>
-              <a:ext uri="{FF2B5EF4-FFF2-40B4-BE49-F238E27FC236}">
-                <a16:creationId xmlns:a16="http://schemas.microsoft.com/office/drawing/2014/main" id="{D300F50E-7063-64DB-C6BB-7E789C8852C1}"/>
+          <p:cNvPr id="9" name="Imagem 8">
+            <a:extLst>
+              <a:ext uri="{FF2B5EF4-FFF2-40B4-BE49-F238E27FC236}">
+                <a16:creationId xmlns:a16="http://schemas.microsoft.com/office/drawing/2014/main" id="{C21204B8-5FB8-6345-01F5-C5AC7D5F3A76}"/>
               </a:ext>
             </a:extLst>
           </p:cNvPr>
@@ -4578,15 +4326,21 @@
           <p:nvPr/>
         </p:nvPicPr>
         <p:blipFill>
-          <a:blip r:embed="rId4"/>
+          <a:blip r:embed="rId4">
+            <a:extLst>
+              <a:ext uri="{28A0092B-C50C-407E-A947-70E740481C1C}">
+                <a14:useLocalDpi xmlns:a14="http://schemas.microsoft.com/office/drawing/2010/main" val="0"/>
+              </a:ext>
+            </a:extLst>
+          </a:blip>
           <a:stretch>
             <a:fillRect/>
           </a:stretch>
         </p:blipFill>
         <p:spPr>
           <a:xfrm>
-            <a:off x="1197810" y="2248770"/>
-            <a:ext cx="9796373" cy="751539"/>
+            <a:off x="723148" y="1175038"/>
+            <a:ext cx="10745700" cy="1905266"/>
           </a:xfrm>
           <a:prstGeom prst="rect">
             <a:avLst/>
@@ -4614,7 +4368,7 @@
         <p:cNvPr id="1" name="">
           <a:extLst>
             <a:ext uri="{FF2B5EF4-FFF2-40B4-BE49-F238E27FC236}">
-              <a16:creationId xmlns:a16="http://schemas.microsoft.com/office/drawing/2014/main" id="{303D7E18-429E-1070-D3CE-93BDA6195ECD}"/>
+              <a16:creationId xmlns:a16="http://schemas.microsoft.com/office/drawing/2014/main" id="{C368748A-5D03-DDBA-5E46-3554CFF60D53}"/>
             </a:ext>
           </a:extLst>
         </p:cNvPr>
@@ -4634,7 +4388,7 @@
           <p:cNvPr id="5" name="Imagem 4">
             <a:extLst>
               <a:ext uri="{FF2B5EF4-FFF2-40B4-BE49-F238E27FC236}">
-                <a16:creationId xmlns:a16="http://schemas.microsoft.com/office/drawing/2014/main" id="{336417CD-7AEC-96BB-1E02-E0410250D289}"/>
+                <a16:creationId xmlns:a16="http://schemas.microsoft.com/office/drawing/2014/main" id="{367534E4-E2B5-86C9-3729-61D8C612FD52}"/>
               </a:ext>
             </a:extLst>
           </p:cNvPr>
@@ -4667,10 +4421,10 @@
       </p:pic>
       <p:sp>
         <p:nvSpPr>
-          <p:cNvPr id="2" name="CaixaDeTexto 1">
-            <a:extLst>
-              <a:ext uri="{FF2B5EF4-FFF2-40B4-BE49-F238E27FC236}">
-                <a16:creationId xmlns:a16="http://schemas.microsoft.com/office/drawing/2014/main" id="{F8324FFD-0200-B1E4-651A-4885631B804A}"/>
+          <p:cNvPr id="4" name="CaixaDeTexto 3">
+            <a:extLst>
+              <a:ext uri="{FF2B5EF4-FFF2-40B4-BE49-F238E27FC236}">
+                <a16:creationId xmlns:a16="http://schemas.microsoft.com/office/drawing/2014/main" id="{DA058A94-1BCB-C942-F101-964545DA50F4}"/>
               </a:ext>
             </a:extLst>
           </p:cNvPr>
@@ -4679,8 +4433,8 @@
         </p:nvSpPr>
         <p:spPr>
           <a:xfrm>
-            <a:off x="4500974" y="180011"/>
-            <a:ext cx="3190051" cy="646331"/>
+            <a:off x="4353749" y="180011"/>
+            <a:ext cx="3484502" cy="646331"/>
           </a:xfrm>
           <a:prstGeom prst="rect">
             <a:avLst/>
@@ -4694,87 +4448,23 @@
           <a:lstStyle/>
           <a:p>
             <a:r>
+              <a:rPr lang="en-US" sz="3600" dirty="0" err="1"/>
+              <a:t>Comando</a:t>
+            </a:r>
+            <a:r>
               <a:rPr lang="en-US" sz="3600" dirty="0"/>
-              <a:t>Busca de Dados</a:t>
+              <a:t> SELECT</a:t>
             </a:r>
             <a:endParaRPr lang="pt-BR" sz="3600" dirty="0"/>
-          </a:p>
-        </p:txBody>
-      </p:sp>
-      <p:sp>
-        <p:nvSpPr>
-          <p:cNvPr id="3" name="CaixaDeTexto 2">
-            <a:extLst>
-              <a:ext uri="{FF2B5EF4-FFF2-40B4-BE49-F238E27FC236}">
-                <a16:creationId xmlns:a16="http://schemas.microsoft.com/office/drawing/2014/main" id="{53CDA829-66E3-9537-D822-87AD13002080}"/>
-              </a:ext>
-            </a:extLst>
-          </p:cNvPr>
-          <p:cNvSpPr txBox="1"/>
-          <p:nvPr/>
-        </p:nvSpPr>
-        <p:spPr>
-          <a:xfrm>
-            <a:off x="2830847" y="1288478"/>
-            <a:ext cx="6530304" cy="523220"/>
-          </a:xfrm>
-          <a:prstGeom prst="rect">
-            <a:avLst/>
-          </a:prstGeom>
-          <a:noFill/>
-        </p:spPr>
-        <p:txBody>
-          <a:bodyPr wrap="square" rtlCol="0">
-            <a:spAutoFit/>
-          </a:bodyPr>
-          <a:lstStyle/>
-          <a:p>
-            <a:r>
-              <a:rPr lang="en-US" sz="2800" dirty="0" err="1"/>
-              <a:t>Buscando</a:t>
-            </a:r>
-            <a:r>
-              <a:rPr lang="en-US" sz="2800" dirty="0"/>
-              <a:t> </a:t>
-            </a:r>
-            <a:r>
-              <a:rPr lang="en-US" sz="2800" dirty="0" err="1"/>
-              <a:t>valores</a:t>
-            </a:r>
-            <a:r>
-              <a:rPr lang="en-US" sz="2800" dirty="0"/>
-              <a:t> </a:t>
-            </a:r>
-            <a:r>
-              <a:rPr lang="en-US" sz="2800" dirty="0" err="1"/>
-              <a:t>usando</a:t>
-            </a:r>
-            <a:r>
-              <a:rPr lang="en-US" sz="2800" dirty="0"/>
-              <a:t> </a:t>
-            </a:r>
-            <a:r>
-              <a:rPr lang="en-US" sz="2800" dirty="0" err="1"/>
-              <a:t>funções</a:t>
-            </a:r>
-            <a:r>
-              <a:rPr lang="en-US" sz="2800" dirty="0"/>
-              <a:t> </a:t>
-            </a:r>
-            <a:r>
-              <a:rPr lang="en-US" sz="2800" dirty="0" err="1"/>
-              <a:t>auxiliares</a:t>
-            </a:r>
-            <a:endParaRPr lang="pt-BR" sz="2800" dirty="0"/>
           </a:p>
         </p:txBody>
       </p:sp>
       <p:pic>
         <p:nvPicPr>
-          <p:cNvPr id="8" name="Imagem 7">
-            <a:extLst>
-              <a:ext uri="{FF2B5EF4-FFF2-40B4-BE49-F238E27FC236}">
-                <a16:creationId xmlns:a16="http://schemas.microsoft.com/office/drawing/2014/main" id="{8521EBDD-2248-5DEF-82D4-B4102CE14D3D}"/>
+          <p:cNvPr id="3" name="Imagem 2" descr="Interface gráfica do usuário, Texto, Aplicativo&#10;&#10;O conteúdo gerado por IA pode estar incorreto.">
+            <a:extLst>
+              <a:ext uri="{FF2B5EF4-FFF2-40B4-BE49-F238E27FC236}">
+                <a16:creationId xmlns:a16="http://schemas.microsoft.com/office/drawing/2014/main" id="{905C2452-7CEA-E759-F2F3-979124860D74}"/>
               </a:ext>
             </a:extLst>
           </p:cNvPr>
@@ -4791,8 +4481,8 @@
         </p:blipFill>
         <p:spPr>
           <a:xfrm>
-            <a:off x="496464" y="2225408"/>
-            <a:ext cx="5457285" cy="1291879"/>
+            <a:off x="3408184" y="4263915"/>
+            <a:ext cx="5375629" cy="1834039"/>
           </a:xfrm>
           <a:prstGeom prst="rect">
             <a:avLst/>
@@ -4801,10 +4491,10 @@
       </p:pic>
       <p:pic>
         <p:nvPicPr>
-          <p:cNvPr id="10" name="Imagem 9">
-            <a:extLst>
-              <a:ext uri="{FF2B5EF4-FFF2-40B4-BE49-F238E27FC236}">
-                <a16:creationId xmlns:a16="http://schemas.microsoft.com/office/drawing/2014/main" id="{88BBB38E-5E4F-5416-0FC4-C900F267AB79}"/>
+          <p:cNvPr id="7" name="Imagem 6">
+            <a:extLst>
+              <a:ext uri="{FF2B5EF4-FFF2-40B4-BE49-F238E27FC236}">
+                <a16:creationId xmlns:a16="http://schemas.microsoft.com/office/drawing/2014/main" id="{930DA949-DFBA-3401-DA93-09C1E1DC1456}"/>
               </a:ext>
             </a:extLst>
           </p:cNvPr>
@@ -4814,165 +4504,21 @@
           <p:nvPr/>
         </p:nvPicPr>
         <p:blipFill>
-          <a:blip r:embed="rId4"/>
+          <a:blip r:embed="rId4">
+            <a:extLst>
+              <a:ext uri="{28A0092B-C50C-407E-A947-70E740481C1C}">
+                <a14:useLocalDpi xmlns:a14="http://schemas.microsoft.com/office/drawing/2010/main" val="0"/>
+              </a:ext>
+            </a:extLst>
+          </a:blip>
           <a:stretch>
             <a:fillRect/>
           </a:stretch>
         </p:blipFill>
         <p:spPr>
           <a:xfrm>
-            <a:off x="496464" y="3828947"/>
-            <a:ext cx="5453497" cy="611168"/>
-          </a:xfrm>
-          <a:prstGeom prst="rect">
-            <a:avLst/>
-          </a:prstGeom>
-        </p:spPr>
-      </p:pic>
-      <p:pic>
-        <p:nvPicPr>
-          <p:cNvPr id="12" name="Imagem 11">
-            <a:extLst>
-              <a:ext uri="{FF2B5EF4-FFF2-40B4-BE49-F238E27FC236}">
-                <a16:creationId xmlns:a16="http://schemas.microsoft.com/office/drawing/2014/main" id="{550D689A-88EC-38FD-6C83-F310EA1061E9}"/>
-              </a:ext>
-            </a:extLst>
-          </p:cNvPr>
-          <p:cNvPicPr>
-            <a:picLocks noChangeAspect="1"/>
-          </p:cNvPicPr>
-          <p:nvPr/>
-        </p:nvPicPr>
-        <p:blipFill>
-          <a:blip r:embed="rId5"/>
-          <a:stretch>
-            <a:fillRect/>
-          </a:stretch>
-        </p:blipFill>
-        <p:spPr>
-          <a:xfrm>
-            <a:off x="1419862" y="4751775"/>
-            <a:ext cx="3459501" cy="1169409"/>
-          </a:xfrm>
-          <a:prstGeom prst="rect">
-            <a:avLst/>
-          </a:prstGeom>
-        </p:spPr>
-      </p:pic>
-      <p:pic>
-        <p:nvPicPr>
-          <p:cNvPr id="14" name="Imagem 13">
-            <a:extLst>
-              <a:ext uri="{FF2B5EF4-FFF2-40B4-BE49-F238E27FC236}">
-                <a16:creationId xmlns:a16="http://schemas.microsoft.com/office/drawing/2014/main" id="{E62A5328-BB65-1BC5-236F-84E6EDA2B1A9}"/>
-              </a:ext>
-            </a:extLst>
-          </p:cNvPr>
-          <p:cNvPicPr>
-            <a:picLocks noChangeAspect="1"/>
-          </p:cNvPicPr>
-          <p:nvPr/>
-        </p:nvPicPr>
-        <p:blipFill>
-          <a:blip r:embed="rId6"/>
-          <a:stretch>
-            <a:fillRect/>
-          </a:stretch>
-        </p:blipFill>
-        <p:spPr>
-          <a:xfrm>
-            <a:off x="6819713" y="2171920"/>
-            <a:ext cx="3977911" cy="852410"/>
-          </a:xfrm>
-          <a:prstGeom prst="rect">
-            <a:avLst/>
-          </a:prstGeom>
-        </p:spPr>
-      </p:pic>
-      <p:pic>
-        <p:nvPicPr>
-          <p:cNvPr id="16" name="Imagem 15">
-            <a:extLst>
-              <a:ext uri="{FF2B5EF4-FFF2-40B4-BE49-F238E27FC236}">
-                <a16:creationId xmlns:a16="http://schemas.microsoft.com/office/drawing/2014/main" id="{B9E62033-21CF-51EA-7D96-AA69C13A9A0F}"/>
-              </a:ext>
-            </a:extLst>
-          </p:cNvPr>
-          <p:cNvPicPr>
-            <a:picLocks noChangeAspect="1"/>
-          </p:cNvPicPr>
-          <p:nvPr/>
-        </p:nvPicPr>
-        <p:blipFill>
-          <a:blip r:embed="rId7"/>
-          <a:stretch>
-            <a:fillRect/>
-          </a:stretch>
-        </p:blipFill>
-        <p:spPr>
-          <a:xfrm>
-            <a:off x="7937419" y="3116941"/>
-            <a:ext cx="1742498" cy="930652"/>
-          </a:xfrm>
-          <a:prstGeom prst="rect">
-            <a:avLst/>
-          </a:prstGeom>
-        </p:spPr>
-      </p:pic>
-      <p:pic>
-        <p:nvPicPr>
-          <p:cNvPr id="18" name="Imagem 17">
-            <a:extLst>
-              <a:ext uri="{FF2B5EF4-FFF2-40B4-BE49-F238E27FC236}">
-                <a16:creationId xmlns:a16="http://schemas.microsoft.com/office/drawing/2014/main" id="{02612DC4-6465-2CE8-63F8-4D51EED6C793}"/>
-              </a:ext>
-            </a:extLst>
-          </p:cNvPr>
-          <p:cNvPicPr>
-            <a:picLocks noChangeAspect="1"/>
-          </p:cNvPicPr>
-          <p:nvPr/>
-        </p:nvPicPr>
-        <p:blipFill>
-          <a:blip r:embed="rId8"/>
-          <a:stretch>
-            <a:fillRect/>
-          </a:stretch>
-        </p:blipFill>
-        <p:spPr>
-          <a:xfrm>
-            <a:off x="6813629" y="4471822"/>
-            <a:ext cx="3962402" cy="559905"/>
-          </a:xfrm>
-          <a:prstGeom prst="rect">
-            <a:avLst/>
-          </a:prstGeom>
-        </p:spPr>
-      </p:pic>
-      <p:pic>
-        <p:nvPicPr>
-          <p:cNvPr id="20" name="Imagem 19">
-            <a:extLst>
-              <a:ext uri="{FF2B5EF4-FFF2-40B4-BE49-F238E27FC236}">
-                <a16:creationId xmlns:a16="http://schemas.microsoft.com/office/drawing/2014/main" id="{6F7A4517-A440-35E9-C0B7-0BF39A618058}"/>
-              </a:ext>
-            </a:extLst>
-          </p:cNvPr>
-          <p:cNvPicPr>
-            <a:picLocks noChangeAspect="1"/>
-          </p:cNvPicPr>
-          <p:nvPr/>
-        </p:nvPicPr>
-        <p:blipFill>
-          <a:blip r:embed="rId9"/>
-          <a:stretch>
-            <a:fillRect/>
-          </a:stretch>
-        </p:blipFill>
-        <p:spPr>
-          <a:xfrm>
-            <a:off x="7908363" y="5455858"/>
-            <a:ext cx="1800609" cy="930652"/>
+            <a:off x="1151834" y="1560498"/>
+            <a:ext cx="9888330" cy="1943371"/>
           </a:xfrm>
           <a:prstGeom prst="rect">
             <a:avLst/>
@@ -4982,7 +4528,7 @@
     </p:spTree>
     <p:extLst>
       <p:ext uri="{BB962C8B-B14F-4D97-AF65-F5344CB8AC3E}">
-        <p14:creationId xmlns:p14="http://schemas.microsoft.com/office/powerpoint/2010/main" val="3389699317"/>
+        <p14:creationId xmlns:p14="http://schemas.microsoft.com/office/powerpoint/2010/main" val="3819448214"/>
       </p:ext>
     </p:extLst>
   </p:cSld>
@@ -5000,7 +4546,7 @@
         <p:cNvPr id="1" name="">
           <a:extLst>
             <a:ext uri="{FF2B5EF4-FFF2-40B4-BE49-F238E27FC236}">
-              <a16:creationId xmlns:a16="http://schemas.microsoft.com/office/drawing/2014/main" id="{A9F73D6E-FC32-50DA-1CBC-9FDC465B155C}"/>
+              <a16:creationId xmlns:a16="http://schemas.microsoft.com/office/drawing/2014/main" id="{14067D91-7532-093E-4E97-5B29F7C01AE7}"/>
             </a:ext>
           </a:extLst>
         </p:cNvPr>
@@ -5015,62 +4561,12 @@
           <a:chExt cx="0" cy="0"/>
         </a:xfrm>
       </p:grpSpPr>
-      <p:sp>
-        <p:nvSpPr>
-          <p:cNvPr id="2" name="Título 1">
-            <a:extLst>
-              <a:ext uri="{FF2B5EF4-FFF2-40B4-BE49-F238E27FC236}">
-                <a16:creationId xmlns:a16="http://schemas.microsoft.com/office/drawing/2014/main" id="{7D33F163-C736-9349-5711-22D353FEFD1A}"/>
-              </a:ext>
-            </a:extLst>
-          </p:cNvPr>
-          <p:cNvSpPr>
-            <a:spLocks noGrp="1"/>
-          </p:cNvSpPr>
-          <p:nvPr>
-            <p:ph type="title"/>
-          </p:nvPr>
-        </p:nvSpPr>
-        <p:spPr/>
-        <p:txBody>
-          <a:bodyPr/>
-          <a:lstStyle/>
-          <a:p>
-            <a:endParaRPr lang="pt-BR"/>
-          </a:p>
-        </p:txBody>
-      </p:sp>
-      <p:sp>
-        <p:nvSpPr>
-          <p:cNvPr id="3" name="Espaço Reservado para Conteúdo 2">
-            <a:extLst>
-              <a:ext uri="{FF2B5EF4-FFF2-40B4-BE49-F238E27FC236}">
-                <a16:creationId xmlns:a16="http://schemas.microsoft.com/office/drawing/2014/main" id="{13625611-E7FA-1D72-494A-0AFBC3CF9FB2}"/>
-              </a:ext>
-            </a:extLst>
-          </p:cNvPr>
-          <p:cNvSpPr>
-            <a:spLocks noGrp="1"/>
-          </p:cNvSpPr>
-          <p:nvPr>
-            <p:ph idx="1"/>
-          </p:nvPr>
-        </p:nvSpPr>
-        <p:spPr/>
-        <p:txBody>
-          <a:bodyPr/>
-          <a:lstStyle/>
-          <a:p>
-            <a:endParaRPr lang="pt-BR"/>
-          </a:p>
-        </p:txBody>
-      </p:sp>
       <p:pic>
         <p:nvPicPr>
-          <p:cNvPr id="4" name="Imagem 3">
-            <a:extLst>
-              <a:ext uri="{FF2B5EF4-FFF2-40B4-BE49-F238E27FC236}">
-                <a16:creationId xmlns:a16="http://schemas.microsoft.com/office/drawing/2014/main" id="{743371B3-3339-12F0-DD89-453EBF0A0ED8}"/>
+          <p:cNvPr id="5" name="Imagem 4">
+            <a:extLst>
+              <a:ext uri="{FF2B5EF4-FFF2-40B4-BE49-F238E27FC236}">
+                <a16:creationId xmlns:a16="http://schemas.microsoft.com/office/drawing/2014/main" id="{06B39443-8B77-33F8-0C16-66E56D92BB0B}"/>
               </a:ext>
             </a:extLst>
           </p:cNvPr>
@@ -5103,10 +4599,10 @@
       </p:pic>
       <p:sp>
         <p:nvSpPr>
-          <p:cNvPr id="5" name="CaixaDeTexto 4">
-            <a:extLst>
-              <a:ext uri="{FF2B5EF4-FFF2-40B4-BE49-F238E27FC236}">
-                <a16:creationId xmlns:a16="http://schemas.microsoft.com/office/drawing/2014/main" id="{C30338DA-9061-D8D4-B5A5-66A14A047FD4}"/>
+          <p:cNvPr id="4" name="CaixaDeTexto 3">
+            <a:extLst>
+              <a:ext uri="{FF2B5EF4-FFF2-40B4-BE49-F238E27FC236}">
+                <a16:creationId xmlns:a16="http://schemas.microsoft.com/office/drawing/2014/main" id="{FE6865D7-4E71-D038-7B6C-AB3929587083}"/>
               </a:ext>
             </a:extLst>
           </p:cNvPr>
@@ -5115,8 +4611,8 @@
         </p:nvSpPr>
         <p:spPr>
           <a:xfrm>
-            <a:off x="3924300" y="2413337"/>
-            <a:ext cx="4343400" cy="1938992"/>
+            <a:off x="4353749" y="180011"/>
+            <a:ext cx="3484502" cy="646331"/>
           </a:xfrm>
           <a:prstGeom prst="rect">
             <a:avLst/>
@@ -5129,31 +4625,800 @@
           </a:bodyPr>
           <a:lstStyle/>
           <a:p>
-            <a:pPr algn="ctr"/>
-            <a:r>
-              <a:rPr lang="en-US" sz="6000" dirty="0">
-                <a:solidFill>
-                  <a:schemeClr val="accent5">
-                    <a:lumMod val="75000"/>
-                  </a:schemeClr>
-                </a:solidFill>
-              </a:rPr>
-              <a:t>AULA CONCLUÍDA!</a:t>
-            </a:r>
-            <a:endParaRPr lang="pt-BR" sz="6000" dirty="0">
-              <a:solidFill>
-                <a:schemeClr val="accent5">
-                  <a:lumMod val="75000"/>
-                </a:schemeClr>
-              </a:solidFill>
-            </a:endParaRPr>
-          </a:p>
-        </p:txBody>
-      </p:sp>
+            <a:r>
+              <a:rPr lang="en-US" sz="3600" dirty="0" err="1"/>
+              <a:t>Comando</a:t>
+            </a:r>
+            <a:r>
+              <a:rPr lang="en-US" sz="3600" dirty="0"/>
+              <a:t> SELECT</a:t>
+            </a:r>
+            <a:endParaRPr lang="pt-BR" sz="3600" dirty="0"/>
+          </a:p>
+        </p:txBody>
+      </p:sp>
+      <p:pic>
+        <p:nvPicPr>
+          <p:cNvPr id="7" name="Imagem 6">
+            <a:extLst>
+              <a:ext uri="{FF2B5EF4-FFF2-40B4-BE49-F238E27FC236}">
+                <a16:creationId xmlns:a16="http://schemas.microsoft.com/office/drawing/2014/main" id="{45AEA2A2-51E5-49EB-3235-DB092B2115F3}"/>
+              </a:ext>
+            </a:extLst>
+          </p:cNvPr>
+          <p:cNvPicPr>
+            <a:picLocks noChangeAspect="1"/>
+          </p:cNvPicPr>
+          <p:nvPr/>
+        </p:nvPicPr>
+        <p:blipFill>
+          <a:blip r:embed="rId3">
+            <a:extLst>
+              <a:ext uri="{28A0092B-C50C-407E-A947-70E740481C1C}">
+                <a14:useLocalDpi xmlns:a14="http://schemas.microsoft.com/office/drawing/2010/main" val="0"/>
+              </a:ext>
+            </a:extLst>
+          </a:blip>
+          <a:stretch>
+            <a:fillRect/>
+          </a:stretch>
+        </p:blipFill>
+        <p:spPr>
+          <a:xfrm>
+            <a:off x="530468" y="1541289"/>
+            <a:ext cx="11131062" cy="1887711"/>
+          </a:xfrm>
+          <a:prstGeom prst="rect">
+            <a:avLst/>
+          </a:prstGeom>
+        </p:spPr>
+      </p:pic>
+      <p:pic>
+        <p:nvPicPr>
+          <p:cNvPr id="11" name="Imagem 10" descr="Interface gráfica do usuário, Texto&#10;&#10;O conteúdo gerado por IA pode estar incorreto.">
+            <a:extLst>
+              <a:ext uri="{FF2B5EF4-FFF2-40B4-BE49-F238E27FC236}">
+                <a16:creationId xmlns:a16="http://schemas.microsoft.com/office/drawing/2014/main" id="{7BE0D0D0-AD67-23DD-D3FA-C823769F9647}"/>
+              </a:ext>
+            </a:extLst>
+          </p:cNvPr>
+          <p:cNvPicPr>
+            <a:picLocks noChangeAspect="1"/>
+          </p:cNvPicPr>
+          <p:nvPr/>
+        </p:nvPicPr>
+        <p:blipFill>
+          <a:blip r:embed="rId4"/>
+          <a:stretch>
+            <a:fillRect/>
+          </a:stretch>
+        </p:blipFill>
+        <p:spPr>
+          <a:xfrm>
+            <a:off x="4803012" y="4076696"/>
+            <a:ext cx="2585976" cy="2324104"/>
+          </a:xfrm>
+          <a:prstGeom prst="rect">
+            <a:avLst/>
+          </a:prstGeom>
+        </p:spPr>
+      </p:pic>
     </p:spTree>
     <p:extLst>
       <p:ext uri="{BB962C8B-B14F-4D97-AF65-F5344CB8AC3E}">
-        <p14:creationId xmlns:p14="http://schemas.microsoft.com/office/powerpoint/2010/main" val="3532846639"/>
+        <p14:creationId xmlns:p14="http://schemas.microsoft.com/office/powerpoint/2010/main" val="767951904"/>
+      </p:ext>
+    </p:extLst>
+  </p:cSld>
+  <p:clrMapOvr>
+    <a:masterClrMapping/>
+  </p:clrMapOvr>
+</p:sld>
+</file>
+
+<file path=ppt/slides/slide16.xml><?xml version="1.0" encoding="utf-8"?>
+<p:sld xmlns:a="http://schemas.openxmlformats.org/drawingml/2006/main" xmlns:r="http://schemas.openxmlformats.org/officeDocument/2006/relationships" xmlns:p="http://schemas.openxmlformats.org/presentationml/2006/main">
+  <p:cSld>
+    <p:spTree>
+      <p:nvGrpSpPr>
+        <p:cNvPr id="1" name="">
+          <a:extLst>
+            <a:ext uri="{FF2B5EF4-FFF2-40B4-BE49-F238E27FC236}">
+              <a16:creationId xmlns:a16="http://schemas.microsoft.com/office/drawing/2014/main" id="{2867048E-72C8-EFEA-2201-17B2A68E29D5}"/>
+            </a:ext>
+          </a:extLst>
+        </p:cNvPr>
+        <p:cNvGrpSpPr/>
+        <p:nvPr/>
+      </p:nvGrpSpPr>
+      <p:grpSpPr>
+        <a:xfrm>
+          <a:off x="0" y="0"/>
+          <a:ext cx="0" cy="0"/>
+          <a:chOff x="0" y="0"/>
+          <a:chExt cx="0" cy="0"/>
+        </a:xfrm>
+      </p:grpSpPr>
+      <p:pic>
+        <p:nvPicPr>
+          <p:cNvPr id="5" name="Imagem 4">
+            <a:extLst>
+              <a:ext uri="{FF2B5EF4-FFF2-40B4-BE49-F238E27FC236}">
+                <a16:creationId xmlns:a16="http://schemas.microsoft.com/office/drawing/2014/main" id="{B1203F52-8C5D-3322-F376-D3FB42C1E553}"/>
+              </a:ext>
+            </a:extLst>
+          </p:cNvPr>
+          <p:cNvPicPr>
+            <a:picLocks noChangeAspect="1"/>
+          </p:cNvPicPr>
+          <p:nvPr/>
+        </p:nvPicPr>
+        <p:blipFill>
+          <a:blip r:embed="rId2">
+            <a:extLst>
+              <a:ext uri="{28A0092B-C50C-407E-A947-70E740481C1C}">
+                <a14:useLocalDpi xmlns:a14="http://schemas.microsoft.com/office/drawing/2010/main" val="0"/>
+              </a:ext>
+            </a:extLst>
+          </a:blip>
+          <a:stretch>
+            <a:fillRect/>
+          </a:stretch>
+        </p:blipFill>
+        <p:spPr>
+          <a:xfrm>
+            <a:off x="0" y="0"/>
+            <a:ext cx="12192000" cy="6858000"/>
+          </a:xfrm>
+          <a:prstGeom prst="rect">
+            <a:avLst/>
+          </a:prstGeom>
+        </p:spPr>
+      </p:pic>
+      <p:sp>
+        <p:nvSpPr>
+          <p:cNvPr id="4" name="CaixaDeTexto 3">
+            <a:extLst>
+              <a:ext uri="{FF2B5EF4-FFF2-40B4-BE49-F238E27FC236}">
+                <a16:creationId xmlns:a16="http://schemas.microsoft.com/office/drawing/2014/main" id="{45340CFF-58F7-F2C1-3B30-5FC406B15AAA}"/>
+              </a:ext>
+            </a:extLst>
+          </p:cNvPr>
+          <p:cNvSpPr txBox="1"/>
+          <p:nvPr/>
+        </p:nvSpPr>
+        <p:spPr>
+          <a:xfrm>
+            <a:off x="4353749" y="180011"/>
+            <a:ext cx="3484502" cy="646331"/>
+          </a:xfrm>
+          <a:prstGeom prst="rect">
+            <a:avLst/>
+          </a:prstGeom>
+          <a:noFill/>
+        </p:spPr>
+        <p:txBody>
+          <a:bodyPr wrap="square" rtlCol="0">
+            <a:spAutoFit/>
+          </a:bodyPr>
+          <a:lstStyle/>
+          <a:p>
+            <a:r>
+              <a:rPr lang="en-US" sz="3600" dirty="0" err="1"/>
+              <a:t>Comando</a:t>
+            </a:r>
+            <a:r>
+              <a:rPr lang="en-US" sz="3600" dirty="0"/>
+              <a:t> SELECT</a:t>
+            </a:r>
+            <a:endParaRPr lang="pt-BR" sz="3600" dirty="0"/>
+          </a:p>
+        </p:txBody>
+      </p:sp>
+      <p:pic>
+        <p:nvPicPr>
+          <p:cNvPr id="3" name="Imagem 2" descr="Interface gráfica do usuário, Texto, Aplicativo, chat ou mensagem de texto&#10;&#10;O conteúdo gerado por IA pode estar incorreto.">
+            <a:extLst>
+              <a:ext uri="{FF2B5EF4-FFF2-40B4-BE49-F238E27FC236}">
+                <a16:creationId xmlns:a16="http://schemas.microsoft.com/office/drawing/2014/main" id="{330D47DC-9728-176F-2C96-225CEF0057A6}"/>
+              </a:ext>
+            </a:extLst>
+          </p:cNvPr>
+          <p:cNvPicPr>
+            <a:picLocks noChangeAspect="1"/>
+          </p:cNvPicPr>
+          <p:nvPr/>
+        </p:nvPicPr>
+        <p:blipFill>
+          <a:blip r:embed="rId3"/>
+          <a:stretch>
+            <a:fillRect/>
+          </a:stretch>
+        </p:blipFill>
+        <p:spPr>
+          <a:xfrm>
+            <a:off x="2826818" y="4457650"/>
+            <a:ext cx="6538363" cy="1711863"/>
+          </a:xfrm>
+          <a:prstGeom prst="rect">
+            <a:avLst/>
+          </a:prstGeom>
+        </p:spPr>
+      </p:pic>
+      <p:pic>
+        <p:nvPicPr>
+          <p:cNvPr id="7" name="Imagem 6">
+            <a:extLst>
+              <a:ext uri="{FF2B5EF4-FFF2-40B4-BE49-F238E27FC236}">
+                <a16:creationId xmlns:a16="http://schemas.microsoft.com/office/drawing/2014/main" id="{2BACC7A9-49FA-2BB8-7929-256F433F2B77}"/>
+              </a:ext>
+            </a:extLst>
+          </p:cNvPr>
+          <p:cNvPicPr>
+            <a:picLocks noChangeAspect="1"/>
+          </p:cNvPicPr>
+          <p:nvPr/>
+        </p:nvPicPr>
+        <p:blipFill>
+          <a:blip r:embed="rId4">
+            <a:extLst>
+              <a:ext uri="{28A0092B-C50C-407E-A947-70E740481C1C}">
+                <a14:useLocalDpi xmlns:a14="http://schemas.microsoft.com/office/drawing/2010/main" val="0"/>
+              </a:ext>
+            </a:extLst>
+          </a:blip>
+          <a:stretch>
+            <a:fillRect/>
+          </a:stretch>
+        </p:blipFill>
+        <p:spPr>
+          <a:xfrm>
+            <a:off x="1308587" y="1407467"/>
+            <a:ext cx="9574823" cy="2208479"/>
+          </a:xfrm>
+          <a:prstGeom prst="rect">
+            <a:avLst/>
+          </a:prstGeom>
+        </p:spPr>
+      </p:pic>
+    </p:spTree>
+    <p:extLst>
+      <p:ext uri="{BB962C8B-B14F-4D97-AF65-F5344CB8AC3E}">
+        <p14:creationId xmlns:p14="http://schemas.microsoft.com/office/powerpoint/2010/main" val="2360629895"/>
+      </p:ext>
+    </p:extLst>
+  </p:cSld>
+  <p:clrMapOvr>
+    <a:masterClrMapping/>
+  </p:clrMapOvr>
+</p:sld>
+</file>
+
+<file path=ppt/slides/slide17.xml><?xml version="1.0" encoding="utf-8"?>
+<p:sld xmlns:a="http://schemas.openxmlformats.org/drawingml/2006/main" xmlns:r="http://schemas.openxmlformats.org/officeDocument/2006/relationships" xmlns:p="http://schemas.openxmlformats.org/presentationml/2006/main">
+  <p:cSld>
+    <p:spTree>
+      <p:nvGrpSpPr>
+        <p:cNvPr id="1" name="">
+          <a:extLst>
+            <a:ext uri="{FF2B5EF4-FFF2-40B4-BE49-F238E27FC236}">
+              <a16:creationId xmlns:a16="http://schemas.microsoft.com/office/drawing/2014/main" id="{22A1DE0E-424C-E017-58D2-6350204664DE}"/>
+            </a:ext>
+          </a:extLst>
+        </p:cNvPr>
+        <p:cNvGrpSpPr/>
+        <p:nvPr/>
+      </p:nvGrpSpPr>
+      <p:grpSpPr>
+        <a:xfrm>
+          <a:off x="0" y="0"/>
+          <a:ext cx="0" cy="0"/>
+          <a:chOff x="0" y="0"/>
+          <a:chExt cx="0" cy="0"/>
+        </a:xfrm>
+      </p:grpSpPr>
+      <p:pic>
+        <p:nvPicPr>
+          <p:cNvPr id="5" name="Imagem 4">
+            <a:extLst>
+              <a:ext uri="{FF2B5EF4-FFF2-40B4-BE49-F238E27FC236}">
+                <a16:creationId xmlns:a16="http://schemas.microsoft.com/office/drawing/2014/main" id="{F884F752-A954-04EE-1089-7AF21E504D4A}"/>
+              </a:ext>
+            </a:extLst>
+          </p:cNvPr>
+          <p:cNvPicPr>
+            <a:picLocks noChangeAspect="1"/>
+          </p:cNvPicPr>
+          <p:nvPr/>
+        </p:nvPicPr>
+        <p:blipFill>
+          <a:blip r:embed="rId2">
+            <a:extLst>
+              <a:ext uri="{28A0092B-C50C-407E-A947-70E740481C1C}">
+                <a14:useLocalDpi xmlns:a14="http://schemas.microsoft.com/office/drawing/2010/main" val="0"/>
+              </a:ext>
+            </a:extLst>
+          </a:blip>
+          <a:stretch>
+            <a:fillRect/>
+          </a:stretch>
+        </p:blipFill>
+        <p:spPr>
+          <a:xfrm>
+            <a:off x="0" y="0"/>
+            <a:ext cx="12192000" cy="6858000"/>
+          </a:xfrm>
+          <a:prstGeom prst="rect">
+            <a:avLst/>
+          </a:prstGeom>
+        </p:spPr>
+      </p:pic>
+      <p:sp>
+        <p:nvSpPr>
+          <p:cNvPr id="4" name="CaixaDeTexto 3">
+            <a:extLst>
+              <a:ext uri="{FF2B5EF4-FFF2-40B4-BE49-F238E27FC236}">
+                <a16:creationId xmlns:a16="http://schemas.microsoft.com/office/drawing/2014/main" id="{3ABEFEFB-F14C-8DB4-2C7E-4F4083D3168B}"/>
+              </a:ext>
+            </a:extLst>
+          </p:cNvPr>
+          <p:cNvSpPr txBox="1"/>
+          <p:nvPr/>
+        </p:nvSpPr>
+        <p:spPr>
+          <a:xfrm>
+            <a:off x="4353749" y="180011"/>
+            <a:ext cx="3484502" cy="646331"/>
+          </a:xfrm>
+          <a:prstGeom prst="rect">
+            <a:avLst/>
+          </a:prstGeom>
+          <a:noFill/>
+        </p:spPr>
+        <p:txBody>
+          <a:bodyPr wrap="square" rtlCol="0">
+            <a:spAutoFit/>
+          </a:bodyPr>
+          <a:lstStyle/>
+          <a:p>
+            <a:r>
+              <a:rPr lang="en-US" sz="3600" dirty="0" err="1"/>
+              <a:t>Comando</a:t>
+            </a:r>
+            <a:r>
+              <a:rPr lang="en-US" sz="3600" dirty="0"/>
+              <a:t> SELECT</a:t>
+            </a:r>
+            <a:endParaRPr lang="pt-BR" sz="3600" dirty="0"/>
+          </a:p>
+        </p:txBody>
+      </p:sp>
+      <p:pic>
+        <p:nvPicPr>
+          <p:cNvPr id="3" name="Imagem 2" descr="Interface gráfica do usuário, Texto, Aplicativo&#10;&#10;O conteúdo gerado por IA pode estar incorreto.">
+            <a:extLst>
+              <a:ext uri="{FF2B5EF4-FFF2-40B4-BE49-F238E27FC236}">
+                <a16:creationId xmlns:a16="http://schemas.microsoft.com/office/drawing/2014/main" id="{0956FB8F-9F82-B010-B839-1EA9E1DDB152}"/>
+              </a:ext>
+            </a:extLst>
+          </p:cNvPr>
+          <p:cNvPicPr>
+            <a:picLocks noChangeAspect="1"/>
+          </p:cNvPicPr>
+          <p:nvPr/>
+        </p:nvPicPr>
+        <p:blipFill>
+          <a:blip r:embed="rId3"/>
+          <a:stretch>
+            <a:fillRect/>
+          </a:stretch>
+        </p:blipFill>
+        <p:spPr>
+          <a:xfrm>
+            <a:off x="5155230" y="4085224"/>
+            <a:ext cx="1881540" cy="2388922"/>
+          </a:xfrm>
+          <a:prstGeom prst="rect">
+            <a:avLst/>
+          </a:prstGeom>
+        </p:spPr>
+      </p:pic>
+      <p:pic>
+        <p:nvPicPr>
+          <p:cNvPr id="7" name="Imagem 6">
+            <a:extLst>
+              <a:ext uri="{FF2B5EF4-FFF2-40B4-BE49-F238E27FC236}">
+                <a16:creationId xmlns:a16="http://schemas.microsoft.com/office/drawing/2014/main" id="{5E848FAB-6F30-7245-DF25-09BF7285179E}"/>
+              </a:ext>
+            </a:extLst>
+          </p:cNvPr>
+          <p:cNvPicPr>
+            <a:picLocks noChangeAspect="1"/>
+          </p:cNvPicPr>
+          <p:nvPr/>
+        </p:nvPicPr>
+        <p:blipFill>
+          <a:blip r:embed="rId4">
+            <a:extLst>
+              <a:ext uri="{28A0092B-C50C-407E-A947-70E740481C1C}">
+                <a14:useLocalDpi xmlns:a14="http://schemas.microsoft.com/office/drawing/2010/main" val="0"/>
+              </a:ext>
+            </a:extLst>
+          </a:blip>
+          <a:stretch>
+            <a:fillRect/>
+          </a:stretch>
+        </p:blipFill>
+        <p:spPr>
+          <a:xfrm>
+            <a:off x="1422701" y="1116140"/>
+            <a:ext cx="9346598" cy="2585230"/>
+          </a:xfrm>
+          <a:prstGeom prst="rect">
+            <a:avLst/>
+          </a:prstGeom>
+        </p:spPr>
+      </p:pic>
+    </p:spTree>
+    <p:extLst>
+      <p:ext uri="{BB962C8B-B14F-4D97-AF65-F5344CB8AC3E}">
+        <p14:creationId xmlns:p14="http://schemas.microsoft.com/office/powerpoint/2010/main" val="3898043796"/>
+      </p:ext>
+    </p:extLst>
+  </p:cSld>
+  <p:clrMapOvr>
+    <a:masterClrMapping/>
+  </p:clrMapOvr>
+</p:sld>
+</file>
+
+<file path=ppt/slides/slide18.xml><?xml version="1.0" encoding="utf-8"?>
+<p:sld xmlns:a="http://schemas.openxmlformats.org/drawingml/2006/main" xmlns:r="http://schemas.openxmlformats.org/officeDocument/2006/relationships" xmlns:p="http://schemas.openxmlformats.org/presentationml/2006/main">
+  <p:cSld>
+    <p:spTree>
+      <p:nvGrpSpPr>
+        <p:cNvPr id="1" name="">
+          <a:extLst>
+            <a:ext uri="{FF2B5EF4-FFF2-40B4-BE49-F238E27FC236}">
+              <a16:creationId xmlns:a16="http://schemas.microsoft.com/office/drawing/2014/main" id="{8F5F0C19-47C6-3314-8B1E-21495564609D}"/>
+            </a:ext>
+          </a:extLst>
+        </p:cNvPr>
+        <p:cNvGrpSpPr/>
+        <p:nvPr/>
+      </p:nvGrpSpPr>
+      <p:grpSpPr>
+        <a:xfrm>
+          <a:off x="0" y="0"/>
+          <a:ext cx="0" cy="0"/>
+          <a:chOff x="0" y="0"/>
+          <a:chExt cx="0" cy="0"/>
+        </a:xfrm>
+      </p:grpSpPr>
+      <p:pic>
+        <p:nvPicPr>
+          <p:cNvPr id="5" name="Imagem 4">
+            <a:extLst>
+              <a:ext uri="{FF2B5EF4-FFF2-40B4-BE49-F238E27FC236}">
+                <a16:creationId xmlns:a16="http://schemas.microsoft.com/office/drawing/2014/main" id="{0F4E6AFC-A943-AC92-BD62-E593D83198B4}"/>
+              </a:ext>
+            </a:extLst>
+          </p:cNvPr>
+          <p:cNvPicPr>
+            <a:picLocks noChangeAspect="1"/>
+          </p:cNvPicPr>
+          <p:nvPr/>
+        </p:nvPicPr>
+        <p:blipFill>
+          <a:blip r:embed="rId2">
+            <a:extLst>
+              <a:ext uri="{28A0092B-C50C-407E-A947-70E740481C1C}">
+                <a14:useLocalDpi xmlns:a14="http://schemas.microsoft.com/office/drawing/2010/main" val="0"/>
+              </a:ext>
+            </a:extLst>
+          </a:blip>
+          <a:stretch>
+            <a:fillRect/>
+          </a:stretch>
+        </p:blipFill>
+        <p:spPr>
+          <a:xfrm>
+            <a:off x="0" y="0"/>
+            <a:ext cx="12192000" cy="6858000"/>
+          </a:xfrm>
+          <a:prstGeom prst="rect">
+            <a:avLst/>
+          </a:prstGeom>
+        </p:spPr>
+      </p:pic>
+      <p:sp>
+        <p:nvSpPr>
+          <p:cNvPr id="4" name="CaixaDeTexto 3">
+            <a:extLst>
+              <a:ext uri="{FF2B5EF4-FFF2-40B4-BE49-F238E27FC236}">
+                <a16:creationId xmlns:a16="http://schemas.microsoft.com/office/drawing/2014/main" id="{6CCC813C-21B0-3831-77C2-31F6F6B9E140}"/>
+              </a:ext>
+            </a:extLst>
+          </p:cNvPr>
+          <p:cNvSpPr txBox="1"/>
+          <p:nvPr/>
+        </p:nvSpPr>
+        <p:spPr>
+          <a:xfrm>
+            <a:off x="4353749" y="180011"/>
+            <a:ext cx="3484502" cy="646331"/>
+          </a:xfrm>
+          <a:prstGeom prst="rect">
+            <a:avLst/>
+          </a:prstGeom>
+          <a:noFill/>
+        </p:spPr>
+        <p:txBody>
+          <a:bodyPr wrap="square" rtlCol="0">
+            <a:spAutoFit/>
+          </a:bodyPr>
+          <a:lstStyle/>
+          <a:p>
+            <a:r>
+              <a:rPr lang="en-US" sz="3600" dirty="0" err="1"/>
+              <a:t>Comando</a:t>
+            </a:r>
+            <a:r>
+              <a:rPr lang="en-US" sz="3600" dirty="0"/>
+              <a:t> SELECT</a:t>
+            </a:r>
+            <a:endParaRPr lang="pt-BR" sz="3600" dirty="0"/>
+          </a:p>
+        </p:txBody>
+      </p:sp>
+      <p:pic>
+        <p:nvPicPr>
+          <p:cNvPr id="3" name="Imagem 2" descr="Interface gráfica do usuário, Texto, Aplicativo&#10;&#10;O conteúdo gerado por IA pode estar incorreto.">
+            <a:extLst>
+              <a:ext uri="{FF2B5EF4-FFF2-40B4-BE49-F238E27FC236}">
+                <a16:creationId xmlns:a16="http://schemas.microsoft.com/office/drawing/2014/main" id="{1E2B91A2-8EC5-B03B-4226-C142C44AE8FD}"/>
+              </a:ext>
+            </a:extLst>
+          </p:cNvPr>
+          <p:cNvPicPr>
+            <a:picLocks noChangeAspect="1"/>
+          </p:cNvPicPr>
+          <p:nvPr/>
+        </p:nvPicPr>
+        <p:blipFill>
+          <a:blip r:embed="rId3"/>
+          <a:stretch>
+            <a:fillRect/>
+          </a:stretch>
+        </p:blipFill>
+        <p:spPr>
+          <a:xfrm>
+            <a:off x="4274379" y="3935187"/>
+            <a:ext cx="3643242" cy="2597497"/>
+          </a:xfrm>
+          <a:prstGeom prst="rect">
+            <a:avLst/>
+          </a:prstGeom>
+        </p:spPr>
+      </p:pic>
+      <p:pic>
+        <p:nvPicPr>
+          <p:cNvPr id="7" name="Imagem 6">
+            <a:extLst>
+              <a:ext uri="{FF2B5EF4-FFF2-40B4-BE49-F238E27FC236}">
+                <a16:creationId xmlns:a16="http://schemas.microsoft.com/office/drawing/2014/main" id="{981F3915-7534-ABCA-1FB6-3828EDF02EEC}"/>
+              </a:ext>
+            </a:extLst>
+          </p:cNvPr>
+          <p:cNvPicPr>
+            <a:picLocks noChangeAspect="1"/>
+          </p:cNvPicPr>
+          <p:nvPr/>
+        </p:nvPicPr>
+        <p:blipFill>
+          <a:blip r:embed="rId4">
+            <a:extLst>
+              <a:ext uri="{28A0092B-C50C-407E-A947-70E740481C1C}">
+                <a14:useLocalDpi xmlns:a14="http://schemas.microsoft.com/office/drawing/2010/main" val="0"/>
+              </a:ext>
+            </a:extLst>
+          </a:blip>
+          <a:stretch>
+            <a:fillRect/>
+          </a:stretch>
+        </p:blipFill>
+        <p:spPr>
+          <a:xfrm>
+            <a:off x="688731" y="1524558"/>
+            <a:ext cx="10814538" cy="1712413"/>
+          </a:xfrm>
+          <a:prstGeom prst="rect">
+            <a:avLst/>
+          </a:prstGeom>
+        </p:spPr>
+      </p:pic>
+    </p:spTree>
+    <p:extLst>
+      <p:ext uri="{BB962C8B-B14F-4D97-AF65-F5344CB8AC3E}">
+        <p14:creationId xmlns:p14="http://schemas.microsoft.com/office/powerpoint/2010/main" val="3535871483"/>
+      </p:ext>
+    </p:extLst>
+  </p:cSld>
+  <p:clrMapOvr>
+    <a:masterClrMapping/>
+  </p:clrMapOvr>
+</p:sld>
+</file>
+
+<file path=ppt/slides/slide19.xml><?xml version="1.0" encoding="utf-8"?>
+<p:sld xmlns:a="http://schemas.openxmlformats.org/drawingml/2006/main" xmlns:r="http://schemas.openxmlformats.org/officeDocument/2006/relationships" xmlns:p="http://schemas.openxmlformats.org/presentationml/2006/main">
+  <p:cSld>
+    <p:spTree>
+      <p:nvGrpSpPr>
+        <p:cNvPr id="1" name="">
+          <a:extLst>
+            <a:ext uri="{FF2B5EF4-FFF2-40B4-BE49-F238E27FC236}">
+              <a16:creationId xmlns:a16="http://schemas.microsoft.com/office/drawing/2014/main" id="{1D2DA554-6FFE-5D72-7785-4FEC0827B3FE}"/>
+            </a:ext>
+          </a:extLst>
+        </p:cNvPr>
+        <p:cNvGrpSpPr/>
+        <p:nvPr/>
+      </p:nvGrpSpPr>
+      <p:grpSpPr>
+        <a:xfrm>
+          <a:off x="0" y="0"/>
+          <a:ext cx="0" cy="0"/>
+          <a:chOff x="0" y="0"/>
+          <a:chExt cx="0" cy="0"/>
+        </a:xfrm>
+      </p:grpSpPr>
+      <p:pic>
+        <p:nvPicPr>
+          <p:cNvPr id="5" name="Imagem 4">
+            <a:extLst>
+              <a:ext uri="{FF2B5EF4-FFF2-40B4-BE49-F238E27FC236}">
+                <a16:creationId xmlns:a16="http://schemas.microsoft.com/office/drawing/2014/main" id="{E531DF8E-5B66-4F18-4C9A-D3B9795F12A0}"/>
+              </a:ext>
+            </a:extLst>
+          </p:cNvPr>
+          <p:cNvPicPr>
+            <a:picLocks noChangeAspect="1"/>
+          </p:cNvPicPr>
+          <p:nvPr/>
+        </p:nvPicPr>
+        <p:blipFill>
+          <a:blip r:embed="rId2">
+            <a:extLst>
+              <a:ext uri="{28A0092B-C50C-407E-A947-70E740481C1C}">
+                <a14:useLocalDpi xmlns:a14="http://schemas.microsoft.com/office/drawing/2010/main" val="0"/>
+              </a:ext>
+            </a:extLst>
+          </a:blip>
+          <a:stretch>
+            <a:fillRect/>
+          </a:stretch>
+        </p:blipFill>
+        <p:spPr>
+          <a:xfrm>
+            <a:off x="0" y="0"/>
+            <a:ext cx="12192000" cy="6858000"/>
+          </a:xfrm>
+          <a:prstGeom prst="rect">
+            <a:avLst/>
+          </a:prstGeom>
+        </p:spPr>
+      </p:pic>
+      <p:sp>
+        <p:nvSpPr>
+          <p:cNvPr id="4" name="CaixaDeTexto 3">
+            <a:extLst>
+              <a:ext uri="{FF2B5EF4-FFF2-40B4-BE49-F238E27FC236}">
+                <a16:creationId xmlns:a16="http://schemas.microsoft.com/office/drawing/2014/main" id="{CC9F1FB5-2E73-6727-C8A2-90B0E23C98DC}"/>
+              </a:ext>
+            </a:extLst>
+          </p:cNvPr>
+          <p:cNvSpPr txBox="1"/>
+          <p:nvPr/>
+        </p:nvSpPr>
+        <p:spPr>
+          <a:xfrm>
+            <a:off x="4353749" y="180011"/>
+            <a:ext cx="3484502" cy="646331"/>
+          </a:xfrm>
+          <a:prstGeom prst="rect">
+            <a:avLst/>
+          </a:prstGeom>
+          <a:noFill/>
+        </p:spPr>
+        <p:txBody>
+          <a:bodyPr wrap="square" rtlCol="0">
+            <a:spAutoFit/>
+          </a:bodyPr>
+          <a:lstStyle/>
+          <a:p>
+            <a:r>
+              <a:rPr lang="en-US" sz="3600" dirty="0" err="1"/>
+              <a:t>Comando</a:t>
+            </a:r>
+            <a:r>
+              <a:rPr lang="en-US" sz="3600" dirty="0"/>
+              <a:t> SELECT</a:t>
+            </a:r>
+            <a:endParaRPr lang="pt-BR" sz="3600" dirty="0"/>
+          </a:p>
+        </p:txBody>
+      </p:sp>
+      <p:pic>
+        <p:nvPicPr>
+          <p:cNvPr id="3" name="Imagem 2" descr="Interface gráfica do usuário, Texto&#10;&#10;O conteúdo gerado por IA pode estar incorreto.">
+            <a:extLst>
+              <a:ext uri="{FF2B5EF4-FFF2-40B4-BE49-F238E27FC236}">
+                <a16:creationId xmlns:a16="http://schemas.microsoft.com/office/drawing/2014/main" id="{D284FB09-14E1-C54F-100B-8B79FA23BD0B}"/>
+              </a:ext>
+            </a:extLst>
+          </p:cNvPr>
+          <p:cNvPicPr>
+            <a:picLocks noChangeAspect="1"/>
+          </p:cNvPicPr>
+          <p:nvPr/>
+        </p:nvPicPr>
+        <p:blipFill>
+          <a:blip r:embed="rId3"/>
+          <a:stretch>
+            <a:fillRect/>
+          </a:stretch>
+        </p:blipFill>
+        <p:spPr>
+          <a:xfrm>
+            <a:off x="4308639" y="3970356"/>
+            <a:ext cx="3574722" cy="2584541"/>
+          </a:xfrm>
+          <a:prstGeom prst="rect">
+            <a:avLst/>
+          </a:prstGeom>
+        </p:spPr>
+      </p:pic>
+      <p:pic>
+        <p:nvPicPr>
+          <p:cNvPr id="7" name="Imagem 6">
+            <a:extLst>
+              <a:ext uri="{FF2B5EF4-FFF2-40B4-BE49-F238E27FC236}">
+                <a16:creationId xmlns:a16="http://schemas.microsoft.com/office/drawing/2014/main" id="{C5C819D5-E2EC-420A-F63C-BBE38711F87E}"/>
+              </a:ext>
+            </a:extLst>
+          </p:cNvPr>
+          <p:cNvPicPr>
+            <a:picLocks noChangeAspect="1"/>
+          </p:cNvPicPr>
+          <p:nvPr/>
+        </p:nvPicPr>
+        <p:blipFill>
+          <a:blip r:embed="rId4">
+            <a:extLst>
+              <a:ext uri="{28A0092B-C50C-407E-A947-70E740481C1C}">
+                <a14:useLocalDpi xmlns:a14="http://schemas.microsoft.com/office/drawing/2010/main" val="0"/>
+              </a:ext>
+            </a:extLst>
+          </a:blip>
+          <a:stretch>
+            <a:fillRect/>
+          </a:stretch>
+        </p:blipFill>
+        <p:spPr>
+          <a:xfrm>
+            <a:off x="701919" y="1569849"/>
+            <a:ext cx="10788162" cy="1736059"/>
+          </a:xfrm>
+          <a:prstGeom prst="rect">
+            <a:avLst/>
+          </a:prstGeom>
+        </p:spPr>
+      </p:pic>
+    </p:spTree>
+    <p:extLst>
+      <p:ext uri="{BB962C8B-B14F-4D97-AF65-F5344CB8AC3E}">
+        <p14:creationId xmlns:p14="http://schemas.microsoft.com/office/powerpoint/2010/main" val="696014180"/>
       </p:ext>
     </p:extLst>
   </p:cSld>
@@ -5363,6 +5628,567 @@
     <p:extLst>
       <p:ext uri="{BB962C8B-B14F-4D97-AF65-F5344CB8AC3E}">
         <p14:creationId xmlns:p14="http://schemas.microsoft.com/office/powerpoint/2010/main" val="2776363215"/>
+      </p:ext>
+    </p:extLst>
+  </p:cSld>
+  <p:clrMapOvr>
+    <a:masterClrMapping/>
+  </p:clrMapOvr>
+</p:sld>
+</file>
+
+<file path=ppt/slides/slide20.xml><?xml version="1.0" encoding="utf-8"?>
+<p:sld xmlns:a="http://schemas.openxmlformats.org/drawingml/2006/main" xmlns:r="http://schemas.openxmlformats.org/officeDocument/2006/relationships" xmlns:p="http://schemas.openxmlformats.org/presentationml/2006/main">
+  <p:cSld>
+    <p:spTree>
+      <p:nvGrpSpPr>
+        <p:cNvPr id="1" name="">
+          <a:extLst>
+            <a:ext uri="{FF2B5EF4-FFF2-40B4-BE49-F238E27FC236}">
+              <a16:creationId xmlns:a16="http://schemas.microsoft.com/office/drawing/2014/main" id="{303D7E18-429E-1070-D3CE-93BDA6195ECD}"/>
+            </a:ext>
+          </a:extLst>
+        </p:cNvPr>
+        <p:cNvGrpSpPr/>
+        <p:nvPr/>
+      </p:nvGrpSpPr>
+      <p:grpSpPr>
+        <a:xfrm>
+          <a:off x="0" y="0"/>
+          <a:ext cx="0" cy="0"/>
+          <a:chOff x="0" y="0"/>
+          <a:chExt cx="0" cy="0"/>
+        </a:xfrm>
+      </p:grpSpPr>
+      <p:pic>
+        <p:nvPicPr>
+          <p:cNvPr id="5" name="Imagem 4">
+            <a:extLst>
+              <a:ext uri="{FF2B5EF4-FFF2-40B4-BE49-F238E27FC236}">
+                <a16:creationId xmlns:a16="http://schemas.microsoft.com/office/drawing/2014/main" id="{336417CD-7AEC-96BB-1E02-E0410250D289}"/>
+              </a:ext>
+            </a:extLst>
+          </p:cNvPr>
+          <p:cNvPicPr>
+            <a:picLocks noChangeAspect="1"/>
+          </p:cNvPicPr>
+          <p:nvPr/>
+        </p:nvPicPr>
+        <p:blipFill>
+          <a:blip r:embed="rId2">
+            <a:extLst>
+              <a:ext uri="{28A0092B-C50C-407E-A947-70E740481C1C}">
+                <a14:useLocalDpi xmlns:a14="http://schemas.microsoft.com/office/drawing/2010/main" val="0"/>
+              </a:ext>
+            </a:extLst>
+          </a:blip>
+          <a:stretch>
+            <a:fillRect/>
+          </a:stretch>
+        </p:blipFill>
+        <p:spPr>
+          <a:xfrm>
+            <a:off x="0" y="0"/>
+            <a:ext cx="12192000" cy="6858000"/>
+          </a:xfrm>
+          <a:prstGeom prst="rect">
+            <a:avLst/>
+          </a:prstGeom>
+        </p:spPr>
+      </p:pic>
+      <p:sp>
+        <p:nvSpPr>
+          <p:cNvPr id="3" name="CaixaDeTexto 2">
+            <a:extLst>
+              <a:ext uri="{FF2B5EF4-FFF2-40B4-BE49-F238E27FC236}">
+                <a16:creationId xmlns:a16="http://schemas.microsoft.com/office/drawing/2014/main" id="{53CDA829-66E3-9537-D822-87AD13002080}"/>
+              </a:ext>
+            </a:extLst>
+          </p:cNvPr>
+          <p:cNvSpPr txBox="1"/>
+          <p:nvPr/>
+        </p:nvSpPr>
+        <p:spPr>
+          <a:xfrm>
+            <a:off x="2830847" y="1288478"/>
+            <a:ext cx="6530304" cy="523220"/>
+          </a:xfrm>
+          <a:prstGeom prst="rect">
+            <a:avLst/>
+          </a:prstGeom>
+          <a:noFill/>
+        </p:spPr>
+        <p:txBody>
+          <a:bodyPr wrap="square" rtlCol="0">
+            <a:spAutoFit/>
+          </a:bodyPr>
+          <a:lstStyle/>
+          <a:p>
+            <a:r>
+              <a:rPr lang="en-US" sz="2800" dirty="0" err="1"/>
+              <a:t>Buscando</a:t>
+            </a:r>
+            <a:r>
+              <a:rPr lang="en-US" sz="2800" dirty="0"/>
+              <a:t> </a:t>
+            </a:r>
+            <a:r>
+              <a:rPr lang="en-US" sz="2800" dirty="0" err="1"/>
+              <a:t>valores</a:t>
+            </a:r>
+            <a:r>
+              <a:rPr lang="en-US" sz="2800" dirty="0"/>
+              <a:t> </a:t>
+            </a:r>
+            <a:r>
+              <a:rPr lang="en-US" sz="2800" dirty="0" err="1"/>
+              <a:t>usando</a:t>
+            </a:r>
+            <a:r>
+              <a:rPr lang="en-US" sz="2800" dirty="0"/>
+              <a:t> </a:t>
+            </a:r>
+            <a:r>
+              <a:rPr lang="en-US" sz="2800" dirty="0" err="1"/>
+              <a:t>funções</a:t>
+            </a:r>
+            <a:r>
+              <a:rPr lang="en-US" sz="2800" dirty="0"/>
+              <a:t> </a:t>
+            </a:r>
+            <a:r>
+              <a:rPr lang="en-US" sz="2800" dirty="0" err="1"/>
+              <a:t>auxiliares</a:t>
+            </a:r>
+            <a:endParaRPr lang="pt-BR" sz="2800" dirty="0"/>
+          </a:p>
+        </p:txBody>
+      </p:sp>
+      <p:pic>
+        <p:nvPicPr>
+          <p:cNvPr id="8" name="Imagem 7">
+            <a:extLst>
+              <a:ext uri="{FF2B5EF4-FFF2-40B4-BE49-F238E27FC236}">
+                <a16:creationId xmlns:a16="http://schemas.microsoft.com/office/drawing/2014/main" id="{8521EBDD-2248-5DEF-82D4-B4102CE14D3D}"/>
+              </a:ext>
+            </a:extLst>
+          </p:cNvPr>
+          <p:cNvPicPr>
+            <a:picLocks noChangeAspect="1"/>
+          </p:cNvPicPr>
+          <p:nvPr/>
+        </p:nvPicPr>
+        <p:blipFill>
+          <a:blip r:embed="rId3"/>
+          <a:stretch>
+            <a:fillRect/>
+          </a:stretch>
+        </p:blipFill>
+        <p:spPr>
+          <a:xfrm>
+            <a:off x="496464" y="2225408"/>
+            <a:ext cx="5457285" cy="1291879"/>
+          </a:xfrm>
+          <a:prstGeom prst="rect">
+            <a:avLst/>
+          </a:prstGeom>
+        </p:spPr>
+      </p:pic>
+      <p:pic>
+        <p:nvPicPr>
+          <p:cNvPr id="10" name="Imagem 9">
+            <a:extLst>
+              <a:ext uri="{FF2B5EF4-FFF2-40B4-BE49-F238E27FC236}">
+                <a16:creationId xmlns:a16="http://schemas.microsoft.com/office/drawing/2014/main" id="{88BBB38E-5E4F-5416-0FC4-C900F267AB79}"/>
+              </a:ext>
+            </a:extLst>
+          </p:cNvPr>
+          <p:cNvPicPr>
+            <a:picLocks noChangeAspect="1"/>
+          </p:cNvPicPr>
+          <p:nvPr/>
+        </p:nvPicPr>
+        <p:blipFill>
+          <a:blip r:embed="rId4"/>
+          <a:stretch>
+            <a:fillRect/>
+          </a:stretch>
+        </p:blipFill>
+        <p:spPr>
+          <a:xfrm>
+            <a:off x="496464" y="3828947"/>
+            <a:ext cx="5453497" cy="611168"/>
+          </a:xfrm>
+          <a:prstGeom prst="rect">
+            <a:avLst/>
+          </a:prstGeom>
+        </p:spPr>
+      </p:pic>
+      <p:pic>
+        <p:nvPicPr>
+          <p:cNvPr id="12" name="Imagem 11">
+            <a:extLst>
+              <a:ext uri="{FF2B5EF4-FFF2-40B4-BE49-F238E27FC236}">
+                <a16:creationId xmlns:a16="http://schemas.microsoft.com/office/drawing/2014/main" id="{550D689A-88EC-38FD-6C83-F310EA1061E9}"/>
+              </a:ext>
+            </a:extLst>
+          </p:cNvPr>
+          <p:cNvPicPr>
+            <a:picLocks noChangeAspect="1"/>
+          </p:cNvPicPr>
+          <p:nvPr/>
+        </p:nvPicPr>
+        <p:blipFill>
+          <a:blip r:embed="rId5"/>
+          <a:stretch>
+            <a:fillRect/>
+          </a:stretch>
+        </p:blipFill>
+        <p:spPr>
+          <a:xfrm>
+            <a:off x="1419862" y="4751775"/>
+            <a:ext cx="3459501" cy="1169409"/>
+          </a:xfrm>
+          <a:prstGeom prst="rect">
+            <a:avLst/>
+          </a:prstGeom>
+        </p:spPr>
+      </p:pic>
+      <p:pic>
+        <p:nvPicPr>
+          <p:cNvPr id="14" name="Imagem 13">
+            <a:extLst>
+              <a:ext uri="{FF2B5EF4-FFF2-40B4-BE49-F238E27FC236}">
+                <a16:creationId xmlns:a16="http://schemas.microsoft.com/office/drawing/2014/main" id="{E62A5328-BB65-1BC5-236F-84E6EDA2B1A9}"/>
+              </a:ext>
+            </a:extLst>
+          </p:cNvPr>
+          <p:cNvPicPr>
+            <a:picLocks noChangeAspect="1"/>
+          </p:cNvPicPr>
+          <p:nvPr/>
+        </p:nvPicPr>
+        <p:blipFill>
+          <a:blip r:embed="rId6"/>
+          <a:stretch>
+            <a:fillRect/>
+          </a:stretch>
+        </p:blipFill>
+        <p:spPr>
+          <a:xfrm>
+            <a:off x="6819713" y="2171920"/>
+            <a:ext cx="3977911" cy="852410"/>
+          </a:xfrm>
+          <a:prstGeom prst="rect">
+            <a:avLst/>
+          </a:prstGeom>
+        </p:spPr>
+      </p:pic>
+      <p:pic>
+        <p:nvPicPr>
+          <p:cNvPr id="16" name="Imagem 15">
+            <a:extLst>
+              <a:ext uri="{FF2B5EF4-FFF2-40B4-BE49-F238E27FC236}">
+                <a16:creationId xmlns:a16="http://schemas.microsoft.com/office/drawing/2014/main" id="{B9E62033-21CF-51EA-7D96-AA69C13A9A0F}"/>
+              </a:ext>
+            </a:extLst>
+          </p:cNvPr>
+          <p:cNvPicPr>
+            <a:picLocks noChangeAspect="1"/>
+          </p:cNvPicPr>
+          <p:nvPr/>
+        </p:nvPicPr>
+        <p:blipFill>
+          <a:blip r:embed="rId7"/>
+          <a:stretch>
+            <a:fillRect/>
+          </a:stretch>
+        </p:blipFill>
+        <p:spPr>
+          <a:xfrm>
+            <a:off x="7937419" y="3116941"/>
+            <a:ext cx="1742498" cy="930652"/>
+          </a:xfrm>
+          <a:prstGeom prst="rect">
+            <a:avLst/>
+          </a:prstGeom>
+        </p:spPr>
+      </p:pic>
+      <p:pic>
+        <p:nvPicPr>
+          <p:cNvPr id="18" name="Imagem 17">
+            <a:extLst>
+              <a:ext uri="{FF2B5EF4-FFF2-40B4-BE49-F238E27FC236}">
+                <a16:creationId xmlns:a16="http://schemas.microsoft.com/office/drawing/2014/main" id="{02612DC4-6465-2CE8-63F8-4D51EED6C793}"/>
+              </a:ext>
+            </a:extLst>
+          </p:cNvPr>
+          <p:cNvPicPr>
+            <a:picLocks noChangeAspect="1"/>
+          </p:cNvPicPr>
+          <p:nvPr/>
+        </p:nvPicPr>
+        <p:blipFill>
+          <a:blip r:embed="rId8"/>
+          <a:stretch>
+            <a:fillRect/>
+          </a:stretch>
+        </p:blipFill>
+        <p:spPr>
+          <a:xfrm>
+            <a:off x="6813629" y="4471822"/>
+            <a:ext cx="3962402" cy="559905"/>
+          </a:xfrm>
+          <a:prstGeom prst="rect">
+            <a:avLst/>
+          </a:prstGeom>
+        </p:spPr>
+      </p:pic>
+      <p:pic>
+        <p:nvPicPr>
+          <p:cNvPr id="20" name="Imagem 19">
+            <a:extLst>
+              <a:ext uri="{FF2B5EF4-FFF2-40B4-BE49-F238E27FC236}">
+                <a16:creationId xmlns:a16="http://schemas.microsoft.com/office/drawing/2014/main" id="{6F7A4517-A440-35E9-C0B7-0BF39A618058}"/>
+              </a:ext>
+            </a:extLst>
+          </p:cNvPr>
+          <p:cNvPicPr>
+            <a:picLocks noChangeAspect="1"/>
+          </p:cNvPicPr>
+          <p:nvPr/>
+        </p:nvPicPr>
+        <p:blipFill>
+          <a:blip r:embed="rId9"/>
+          <a:stretch>
+            <a:fillRect/>
+          </a:stretch>
+        </p:blipFill>
+        <p:spPr>
+          <a:xfrm>
+            <a:off x="7908363" y="5455858"/>
+            <a:ext cx="1800609" cy="930652"/>
+          </a:xfrm>
+          <a:prstGeom prst="rect">
+            <a:avLst/>
+          </a:prstGeom>
+        </p:spPr>
+      </p:pic>
+      <p:sp>
+        <p:nvSpPr>
+          <p:cNvPr id="4" name="CaixaDeTexto 3">
+            <a:extLst>
+              <a:ext uri="{FF2B5EF4-FFF2-40B4-BE49-F238E27FC236}">
+                <a16:creationId xmlns:a16="http://schemas.microsoft.com/office/drawing/2014/main" id="{B2C1AD53-A057-77C3-9EFE-4E72FA7CB755}"/>
+              </a:ext>
+            </a:extLst>
+          </p:cNvPr>
+          <p:cNvSpPr txBox="1"/>
+          <p:nvPr/>
+        </p:nvSpPr>
+        <p:spPr>
+          <a:xfrm>
+            <a:off x="4353749" y="180011"/>
+            <a:ext cx="3484502" cy="646331"/>
+          </a:xfrm>
+          <a:prstGeom prst="rect">
+            <a:avLst/>
+          </a:prstGeom>
+          <a:noFill/>
+        </p:spPr>
+        <p:txBody>
+          <a:bodyPr wrap="square" rtlCol="0">
+            <a:spAutoFit/>
+          </a:bodyPr>
+          <a:lstStyle/>
+          <a:p>
+            <a:r>
+              <a:rPr lang="en-US" sz="3600" dirty="0" err="1"/>
+              <a:t>Comando</a:t>
+            </a:r>
+            <a:r>
+              <a:rPr lang="en-US" sz="3600" dirty="0"/>
+              <a:t> SELECT</a:t>
+            </a:r>
+            <a:endParaRPr lang="pt-BR" sz="3600" dirty="0"/>
+          </a:p>
+        </p:txBody>
+      </p:sp>
+    </p:spTree>
+    <p:extLst>
+      <p:ext uri="{BB962C8B-B14F-4D97-AF65-F5344CB8AC3E}">
+        <p14:creationId xmlns:p14="http://schemas.microsoft.com/office/powerpoint/2010/main" val="3389699317"/>
+      </p:ext>
+    </p:extLst>
+  </p:cSld>
+  <p:clrMapOvr>
+    <a:masterClrMapping/>
+  </p:clrMapOvr>
+</p:sld>
+</file>
+
+<file path=ppt/slides/slide21.xml><?xml version="1.0" encoding="utf-8"?>
+<p:sld xmlns:a="http://schemas.openxmlformats.org/drawingml/2006/main" xmlns:r="http://schemas.openxmlformats.org/officeDocument/2006/relationships" xmlns:p="http://schemas.openxmlformats.org/presentationml/2006/main">
+  <p:cSld>
+    <p:spTree>
+      <p:nvGrpSpPr>
+        <p:cNvPr id="1" name="">
+          <a:extLst>
+            <a:ext uri="{FF2B5EF4-FFF2-40B4-BE49-F238E27FC236}">
+              <a16:creationId xmlns:a16="http://schemas.microsoft.com/office/drawing/2014/main" id="{A9F73D6E-FC32-50DA-1CBC-9FDC465B155C}"/>
+            </a:ext>
+          </a:extLst>
+        </p:cNvPr>
+        <p:cNvGrpSpPr/>
+        <p:nvPr/>
+      </p:nvGrpSpPr>
+      <p:grpSpPr>
+        <a:xfrm>
+          <a:off x="0" y="0"/>
+          <a:ext cx="0" cy="0"/>
+          <a:chOff x="0" y="0"/>
+          <a:chExt cx="0" cy="0"/>
+        </a:xfrm>
+      </p:grpSpPr>
+      <p:sp>
+        <p:nvSpPr>
+          <p:cNvPr id="2" name="Título 1">
+            <a:extLst>
+              <a:ext uri="{FF2B5EF4-FFF2-40B4-BE49-F238E27FC236}">
+                <a16:creationId xmlns:a16="http://schemas.microsoft.com/office/drawing/2014/main" id="{7D33F163-C736-9349-5711-22D353FEFD1A}"/>
+              </a:ext>
+            </a:extLst>
+          </p:cNvPr>
+          <p:cNvSpPr>
+            <a:spLocks noGrp="1"/>
+          </p:cNvSpPr>
+          <p:nvPr>
+            <p:ph type="title"/>
+          </p:nvPr>
+        </p:nvSpPr>
+        <p:spPr/>
+        <p:txBody>
+          <a:bodyPr/>
+          <a:lstStyle/>
+          <a:p>
+            <a:endParaRPr lang="pt-BR"/>
+          </a:p>
+        </p:txBody>
+      </p:sp>
+      <p:sp>
+        <p:nvSpPr>
+          <p:cNvPr id="3" name="Espaço Reservado para Conteúdo 2">
+            <a:extLst>
+              <a:ext uri="{FF2B5EF4-FFF2-40B4-BE49-F238E27FC236}">
+                <a16:creationId xmlns:a16="http://schemas.microsoft.com/office/drawing/2014/main" id="{13625611-E7FA-1D72-494A-0AFBC3CF9FB2}"/>
+              </a:ext>
+            </a:extLst>
+          </p:cNvPr>
+          <p:cNvSpPr>
+            <a:spLocks noGrp="1"/>
+          </p:cNvSpPr>
+          <p:nvPr>
+            <p:ph idx="1"/>
+          </p:nvPr>
+        </p:nvSpPr>
+        <p:spPr/>
+        <p:txBody>
+          <a:bodyPr/>
+          <a:lstStyle/>
+          <a:p>
+            <a:endParaRPr lang="pt-BR"/>
+          </a:p>
+        </p:txBody>
+      </p:sp>
+      <p:pic>
+        <p:nvPicPr>
+          <p:cNvPr id="4" name="Imagem 3">
+            <a:extLst>
+              <a:ext uri="{FF2B5EF4-FFF2-40B4-BE49-F238E27FC236}">
+                <a16:creationId xmlns:a16="http://schemas.microsoft.com/office/drawing/2014/main" id="{743371B3-3339-12F0-DD89-453EBF0A0ED8}"/>
+              </a:ext>
+            </a:extLst>
+          </p:cNvPr>
+          <p:cNvPicPr>
+            <a:picLocks noChangeAspect="1"/>
+          </p:cNvPicPr>
+          <p:nvPr/>
+        </p:nvPicPr>
+        <p:blipFill>
+          <a:blip r:embed="rId2">
+            <a:extLst>
+              <a:ext uri="{28A0092B-C50C-407E-A947-70E740481C1C}">
+                <a14:useLocalDpi xmlns:a14="http://schemas.microsoft.com/office/drawing/2010/main" val="0"/>
+              </a:ext>
+            </a:extLst>
+          </a:blip>
+          <a:stretch>
+            <a:fillRect/>
+          </a:stretch>
+        </p:blipFill>
+        <p:spPr>
+          <a:xfrm>
+            <a:off x="0" y="0"/>
+            <a:ext cx="12192000" cy="6858000"/>
+          </a:xfrm>
+          <a:prstGeom prst="rect">
+            <a:avLst/>
+          </a:prstGeom>
+        </p:spPr>
+      </p:pic>
+      <p:sp>
+        <p:nvSpPr>
+          <p:cNvPr id="5" name="CaixaDeTexto 4">
+            <a:extLst>
+              <a:ext uri="{FF2B5EF4-FFF2-40B4-BE49-F238E27FC236}">
+                <a16:creationId xmlns:a16="http://schemas.microsoft.com/office/drawing/2014/main" id="{C30338DA-9061-D8D4-B5A5-66A14A047FD4}"/>
+              </a:ext>
+            </a:extLst>
+          </p:cNvPr>
+          <p:cNvSpPr txBox="1"/>
+          <p:nvPr/>
+        </p:nvSpPr>
+        <p:spPr>
+          <a:xfrm>
+            <a:off x="3924300" y="2413337"/>
+            <a:ext cx="4343400" cy="1938992"/>
+          </a:xfrm>
+          <a:prstGeom prst="rect">
+            <a:avLst/>
+          </a:prstGeom>
+          <a:noFill/>
+        </p:spPr>
+        <p:txBody>
+          <a:bodyPr wrap="square" rtlCol="0">
+            <a:spAutoFit/>
+          </a:bodyPr>
+          <a:lstStyle/>
+          <a:p>
+            <a:pPr algn="ctr"/>
+            <a:r>
+              <a:rPr lang="en-US" sz="6000" dirty="0">
+                <a:solidFill>
+                  <a:schemeClr val="accent5">
+                    <a:lumMod val="75000"/>
+                  </a:schemeClr>
+                </a:solidFill>
+              </a:rPr>
+              <a:t>AULA CONCLUÍDA!</a:t>
+            </a:r>
+            <a:endParaRPr lang="pt-BR" sz="6000" dirty="0">
+              <a:solidFill>
+                <a:schemeClr val="accent5">
+                  <a:lumMod val="75000"/>
+                </a:schemeClr>
+              </a:solidFill>
+            </a:endParaRPr>
+          </a:p>
+        </p:txBody>
+      </p:sp>
+    </p:spTree>
+    <p:extLst>
+      <p:ext uri="{BB962C8B-B14F-4D97-AF65-F5344CB8AC3E}">
+        <p14:creationId xmlns:p14="http://schemas.microsoft.com/office/powerpoint/2010/main" val="3532846639"/>
       </p:ext>
     </p:extLst>
   </p:cSld>
@@ -5828,10 +6654,10 @@
       </p:sp>
       <p:sp>
         <p:nvSpPr>
-          <p:cNvPr id="3" name="CaixaDeTexto 2">
-            <a:extLst>
-              <a:ext uri="{FF2B5EF4-FFF2-40B4-BE49-F238E27FC236}">
-                <a16:creationId xmlns:a16="http://schemas.microsoft.com/office/drawing/2014/main" id="{68DA849F-A345-483F-6703-3B4AE3543147}"/>
+          <p:cNvPr id="7" name="CaixaDeTexto 6">
+            <a:extLst>
+              <a:ext uri="{FF2B5EF4-FFF2-40B4-BE49-F238E27FC236}">
+                <a16:creationId xmlns:a16="http://schemas.microsoft.com/office/drawing/2014/main" id="{F932733C-EF95-2FDE-AF68-BCE9DB6656E5}"/>
               </a:ext>
             </a:extLst>
           </p:cNvPr>
@@ -5840,8 +6666,8 @@
         </p:nvSpPr>
         <p:spPr>
           <a:xfrm>
-            <a:off x="3305355" y="1314075"/>
-            <a:ext cx="5581286" cy="523220"/>
+            <a:off x="4302365" y="3584361"/>
+            <a:ext cx="3587265" cy="523220"/>
           </a:xfrm>
           <a:prstGeom prst="rect">
             <a:avLst/>
@@ -5855,56 +6681,12 @@
           <a:lstStyle/>
           <a:p>
             <a:r>
-              <a:rPr lang="en-US" sz="2800" dirty="0">
-                <a:solidFill>
-                  <a:srgbClr val="7030A0"/>
-                </a:solidFill>
-              </a:rPr>
-              <a:t>INSERT</a:t>
+              <a:rPr lang="en-US" sz="2800" dirty="0" err="1"/>
+              <a:t>Visualização</a:t>
             </a:r>
             <a:r>
               <a:rPr lang="en-US" sz="2800" dirty="0"/>
-              <a:t> </a:t>
-            </a:r>
-            <a:r>
-              <a:rPr lang="en-US" sz="2800" dirty="0">
-                <a:solidFill>
-                  <a:srgbClr val="7030A0"/>
-                </a:solidFill>
-              </a:rPr>
-              <a:t>INTO</a:t>
-            </a:r>
-            <a:r>
-              <a:rPr lang="en-US" sz="2800" dirty="0"/>
-              <a:t> </a:t>
-            </a:r>
-            <a:r>
-              <a:rPr lang="en-US" sz="2800" dirty="0" err="1"/>
-              <a:t>tabela</a:t>
-            </a:r>
-            <a:r>
-              <a:rPr lang="en-US" sz="2800" dirty="0"/>
-              <a:t> </a:t>
-            </a:r>
-            <a:r>
-              <a:rPr lang="en-US" sz="2800" dirty="0">
-                <a:solidFill>
-                  <a:srgbClr val="7030A0"/>
-                </a:solidFill>
-              </a:rPr>
-              <a:t>VALUES</a:t>
-            </a:r>
-            <a:r>
-              <a:rPr lang="en-US" sz="2800" dirty="0"/>
-              <a:t> (</a:t>
-            </a:r>
-            <a:r>
-              <a:rPr lang="en-US" sz="2800" dirty="0" err="1"/>
-              <a:t>valores</a:t>
-            </a:r>
-            <a:r>
-              <a:rPr lang="en-US" sz="2800" dirty="0"/>
-              <a:t>);</a:t>
+              <a:t> dos dados:</a:t>
             </a:r>
             <a:endParaRPr lang="pt-BR" sz="2800" dirty="0"/>
           </a:p>
@@ -5912,10 +6694,10 @@
       </p:sp>
       <p:pic>
         <p:nvPicPr>
-          <p:cNvPr id="6" name="Imagem 5">
-            <a:extLst>
-              <a:ext uri="{FF2B5EF4-FFF2-40B4-BE49-F238E27FC236}">
-                <a16:creationId xmlns:a16="http://schemas.microsoft.com/office/drawing/2014/main" id="{38ECFF08-3214-FD32-DA35-182EB61B5194}"/>
+          <p:cNvPr id="9" name="Imagem 8">
+            <a:extLst>
+              <a:ext uri="{FF2B5EF4-FFF2-40B4-BE49-F238E27FC236}">
+                <a16:creationId xmlns:a16="http://schemas.microsoft.com/office/drawing/2014/main" id="{140AEC89-9542-9D16-632E-973780FBE14F}"/>
               </a:ext>
             </a:extLst>
           </p:cNvPr>
@@ -5932,60 +6714,20 @@
         </p:blipFill>
         <p:spPr>
           <a:xfrm>
-            <a:off x="274851" y="2140417"/>
-            <a:ext cx="11642294" cy="1244919"/>
+            <a:off x="2852356" y="4306607"/>
+            <a:ext cx="6487287" cy="1773740"/>
           </a:xfrm>
           <a:prstGeom prst="rect">
             <a:avLst/>
           </a:prstGeom>
         </p:spPr>
       </p:pic>
-      <p:sp>
-        <p:nvSpPr>
-          <p:cNvPr id="7" name="CaixaDeTexto 6">
-            <a:extLst>
-              <a:ext uri="{FF2B5EF4-FFF2-40B4-BE49-F238E27FC236}">
-                <a16:creationId xmlns:a16="http://schemas.microsoft.com/office/drawing/2014/main" id="{F932733C-EF95-2FDE-AF68-BCE9DB6656E5}"/>
-              </a:ext>
-            </a:extLst>
-          </p:cNvPr>
-          <p:cNvSpPr txBox="1"/>
-          <p:nvPr/>
-        </p:nvSpPr>
-        <p:spPr>
-          <a:xfrm>
-            <a:off x="4302365" y="3584361"/>
-            <a:ext cx="3587265" cy="523220"/>
-          </a:xfrm>
-          <a:prstGeom prst="rect">
-            <a:avLst/>
-          </a:prstGeom>
-          <a:noFill/>
-        </p:spPr>
-        <p:txBody>
-          <a:bodyPr wrap="square" rtlCol="0">
-            <a:spAutoFit/>
-          </a:bodyPr>
-          <a:lstStyle/>
-          <a:p>
-            <a:r>
-              <a:rPr lang="en-US" sz="2800" dirty="0" err="1"/>
-              <a:t>Visualização</a:t>
-            </a:r>
-            <a:r>
-              <a:rPr lang="en-US" sz="2800" dirty="0"/>
-              <a:t> dos dados:</a:t>
-            </a:r>
-            <a:endParaRPr lang="pt-BR" sz="2800" dirty="0"/>
-          </a:p>
-        </p:txBody>
-      </p:sp>
       <p:pic>
         <p:nvPicPr>
-          <p:cNvPr id="9" name="Imagem 8">
-            <a:extLst>
-              <a:ext uri="{FF2B5EF4-FFF2-40B4-BE49-F238E27FC236}">
-                <a16:creationId xmlns:a16="http://schemas.microsoft.com/office/drawing/2014/main" id="{140AEC89-9542-9D16-632E-973780FBE14F}"/>
+          <p:cNvPr id="21" name="Imagem 20">
+            <a:extLst>
+              <a:ext uri="{FF2B5EF4-FFF2-40B4-BE49-F238E27FC236}">
+                <a16:creationId xmlns:a16="http://schemas.microsoft.com/office/drawing/2014/main" id="{22F1C515-043E-352B-4B50-D409E43DB0FB}"/>
               </a:ext>
             </a:extLst>
           </p:cNvPr>
@@ -5995,15 +6737,21 @@
           <p:nvPr/>
         </p:nvPicPr>
         <p:blipFill>
-          <a:blip r:embed="rId4"/>
+          <a:blip r:embed="rId4">
+            <a:extLst>
+              <a:ext uri="{28A0092B-C50C-407E-A947-70E740481C1C}">
+                <a14:useLocalDpi xmlns:a14="http://schemas.microsoft.com/office/drawing/2010/main" val="0"/>
+              </a:ext>
+            </a:extLst>
+          </a:blip>
           <a:stretch>
             <a:fillRect/>
           </a:stretch>
         </p:blipFill>
         <p:spPr>
           <a:xfrm>
-            <a:off x="2852356" y="4306607"/>
-            <a:ext cx="6487287" cy="1773740"/>
+            <a:off x="398582" y="1303703"/>
+            <a:ext cx="11394830" cy="2081632"/>
           </a:xfrm>
           <a:prstGeom prst="rect">
             <a:avLst/>
@@ -6124,90 +6872,6 @@
       </p:sp>
       <p:sp>
         <p:nvSpPr>
-          <p:cNvPr id="6" name="CaixaDeTexto 5">
-            <a:extLst>
-              <a:ext uri="{FF2B5EF4-FFF2-40B4-BE49-F238E27FC236}">
-                <a16:creationId xmlns:a16="http://schemas.microsoft.com/office/drawing/2014/main" id="{E9DE0DC9-FD38-C251-52DD-587D1D027AD2}"/>
-              </a:ext>
-            </a:extLst>
-          </p:cNvPr>
-          <p:cNvSpPr txBox="1"/>
-          <p:nvPr/>
-        </p:nvSpPr>
-        <p:spPr>
-          <a:xfrm>
-            <a:off x="3218367" y="1470811"/>
-            <a:ext cx="5755257" cy="461665"/>
-          </a:xfrm>
-          <a:prstGeom prst="rect">
-            <a:avLst/>
-          </a:prstGeom>
-          <a:noFill/>
-        </p:spPr>
-        <p:txBody>
-          <a:bodyPr wrap="square" rtlCol="0">
-            <a:spAutoFit/>
-          </a:bodyPr>
-          <a:lstStyle/>
-          <a:p>
-            <a:r>
-              <a:rPr lang="en-US" sz="2400" dirty="0">
-                <a:solidFill>
-                  <a:srgbClr val="7030A0"/>
-                </a:solidFill>
-              </a:rPr>
-              <a:t>UPDATE</a:t>
-            </a:r>
-            <a:r>
-              <a:rPr lang="en-US" sz="2400" dirty="0"/>
-              <a:t> </a:t>
-            </a:r>
-            <a:r>
-              <a:rPr lang="en-US" sz="2400" dirty="0" err="1"/>
-              <a:t>tabela</a:t>
-            </a:r>
-            <a:r>
-              <a:rPr lang="en-US" sz="2400" dirty="0"/>
-              <a:t> </a:t>
-            </a:r>
-            <a:r>
-              <a:rPr lang="en-US" sz="2400" dirty="0">
-                <a:solidFill>
-                  <a:srgbClr val="7030A0"/>
-                </a:solidFill>
-              </a:rPr>
-              <a:t>SET</a:t>
-            </a:r>
-            <a:r>
-              <a:rPr lang="en-US" sz="2400" dirty="0"/>
-              <a:t> </a:t>
-            </a:r>
-            <a:r>
-              <a:rPr lang="en-US" sz="2400" dirty="0" err="1"/>
-              <a:t>valorNovo</a:t>
-            </a:r>
-            <a:r>
-              <a:rPr lang="en-US" sz="2400" dirty="0">
-                <a:solidFill>
-                  <a:srgbClr val="7030A0"/>
-                </a:solidFill>
-              </a:rPr>
-              <a:t> WHERE </a:t>
-            </a:r>
-            <a:r>
-              <a:rPr lang="en-US" sz="2400" dirty="0" err="1"/>
-              <a:t>lógica</a:t>
-            </a:r>
-            <a:r>
-              <a:rPr lang="en-US" sz="2400" dirty="0"/>
-              <a:t>;</a:t>
-            </a:r>
-            <a:endParaRPr lang="pt-BR" sz="2400" dirty="0"/>
-          </a:p>
-        </p:txBody>
-      </p:sp>
-      <p:sp>
-        <p:nvSpPr>
           <p:cNvPr id="9" name="CaixaDeTexto 8">
             <a:extLst>
               <a:ext uri="{FF2B5EF4-FFF2-40B4-BE49-F238E27FC236}">
@@ -6308,10 +6972,10 @@
       </p:pic>
       <p:pic>
         <p:nvPicPr>
-          <p:cNvPr id="4" name="Imagem 3">
-            <a:extLst>
-              <a:ext uri="{FF2B5EF4-FFF2-40B4-BE49-F238E27FC236}">
-                <a16:creationId xmlns:a16="http://schemas.microsoft.com/office/drawing/2014/main" id="{7D93D7FA-4937-ACC8-81C6-4CE8215501DE}"/>
+          <p:cNvPr id="10" name="Imagem 9">
+            <a:extLst>
+              <a:ext uri="{FF2B5EF4-FFF2-40B4-BE49-F238E27FC236}">
+                <a16:creationId xmlns:a16="http://schemas.microsoft.com/office/drawing/2014/main" id="{E8203EFB-46AC-D8BB-88E4-65258D6208AA}"/>
               </a:ext>
             </a:extLst>
           </p:cNvPr>
@@ -6321,15 +6985,21 @@
           <p:nvPr/>
         </p:nvPicPr>
         <p:blipFill>
-          <a:blip r:embed="rId5"/>
+          <a:blip r:embed="rId5">
+            <a:extLst>
+              <a:ext uri="{28A0092B-C50C-407E-A947-70E740481C1C}">
+                <a14:useLocalDpi xmlns:a14="http://schemas.microsoft.com/office/drawing/2010/main" val="0"/>
+              </a:ext>
+            </a:extLst>
+          </a:blip>
           <a:stretch>
             <a:fillRect/>
           </a:stretch>
         </p:blipFill>
         <p:spPr>
           <a:xfrm>
-            <a:off x="351618" y="2297153"/>
-            <a:ext cx="11488753" cy="962159"/>
+            <a:off x="526383" y="991184"/>
+            <a:ext cx="11139220" cy="2437816"/>
           </a:xfrm>
           <a:prstGeom prst="rect">
             <a:avLst/>
@@ -6444,70 +7114,6 @@
       </p:sp>
       <p:sp>
         <p:nvSpPr>
-          <p:cNvPr id="7" name="CaixaDeTexto 6">
-            <a:extLst>
-              <a:ext uri="{FF2B5EF4-FFF2-40B4-BE49-F238E27FC236}">
-                <a16:creationId xmlns:a16="http://schemas.microsoft.com/office/drawing/2014/main" id="{6AD9ED3F-F399-FC52-7DCC-84E053216FA6}"/>
-              </a:ext>
-            </a:extLst>
-          </p:cNvPr>
-          <p:cNvSpPr txBox="1"/>
-          <p:nvPr/>
-        </p:nvSpPr>
-        <p:spPr>
-          <a:xfrm>
-            <a:off x="3391726" y="1347986"/>
-            <a:ext cx="5408541" cy="523220"/>
-          </a:xfrm>
-          <a:prstGeom prst="rect">
-            <a:avLst/>
-          </a:prstGeom>
-          <a:noFill/>
-        </p:spPr>
-        <p:txBody>
-          <a:bodyPr wrap="square" rtlCol="0">
-            <a:spAutoFit/>
-          </a:bodyPr>
-          <a:lstStyle/>
-          <a:p>
-            <a:r>
-              <a:rPr lang="en-US" sz="2800" dirty="0">
-                <a:solidFill>
-                  <a:srgbClr val="7030A0"/>
-                </a:solidFill>
-              </a:rPr>
-              <a:t>DELETE FROM</a:t>
-            </a:r>
-            <a:r>
-              <a:rPr lang="en-US" sz="2800" dirty="0"/>
-              <a:t> </a:t>
-            </a:r>
-            <a:r>
-              <a:rPr lang="en-US" sz="2800" dirty="0" err="1"/>
-              <a:t>tabela</a:t>
-            </a:r>
-            <a:r>
-              <a:rPr lang="en-US" sz="2800" dirty="0">
-                <a:solidFill>
-                  <a:srgbClr val="7030A0"/>
-                </a:solidFill>
-              </a:rPr>
-              <a:t> WHERE </a:t>
-            </a:r>
-            <a:r>
-              <a:rPr lang="en-US" sz="2800" dirty="0" err="1"/>
-              <a:t>lógica</a:t>
-            </a:r>
-            <a:r>
-              <a:rPr lang="en-US" sz="2800" dirty="0"/>
-              <a:t>;</a:t>
-            </a:r>
-            <a:endParaRPr lang="pt-BR" sz="2800" dirty="0"/>
-          </a:p>
-        </p:txBody>
-      </p:sp>
-      <p:sp>
-        <p:nvSpPr>
           <p:cNvPr id="10" name="CaixaDeTexto 9">
             <a:extLst>
               <a:ext uri="{FF2B5EF4-FFF2-40B4-BE49-F238E27FC236}">
@@ -6578,10 +7184,10 @@
       </p:pic>
       <p:pic>
         <p:nvPicPr>
-          <p:cNvPr id="3" name="Imagem 2">
-            <a:extLst>
-              <a:ext uri="{FF2B5EF4-FFF2-40B4-BE49-F238E27FC236}">
-                <a16:creationId xmlns:a16="http://schemas.microsoft.com/office/drawing/2014/main" id="{D0070731-9117-8F41-3604-78EF8B71868D}"/>
+          <p:cNvPr id="4" name="Imagem 3">
+            <a:extLst>
+              <a:ext uri="{FF2B5EF4-FFF2-40B4-BE49-F238E27FC236}">
+                <a16:creationId xmlns:a16="http://schemas.microsoft.com/office/drawing/2014/main" id="{DAA36E93-F702-9174-2F88-7323644148A3}"/>
               </a:ext>
             </a:extLst>
           </p:cNvPr>
@@ -6591,15 +7197,21 @@
           <p:nvPr/>
         </p:nvPicPr>
         <p:blipFill>
-          <a:blip r:embed="rId4"/>
+          <a:blip r:embed="rId4">
+            <a:extLst>
+              <a:ext uri="{28A0092B-C50C-407E-A947-70E740481C1C}">
+                <a14:useLocalDpi xmlns:a14="http://schemas.microsoft.com/office/drawing/2010/main" val="0"/>
+              </a:ext>
+            </a:extLst>
+          </a:blip>
           <a:stretch>
             <a:fillRect/>
           </a:stretch>
         </p:blipFill>
         <p:spPr>
           <a:xfrm>
-            <a:off x="1775807" y="2352829"/>
-            <a:ext cx="8640381" cy="609685"/>
+            <a:off x="471268" y="1041432"/>
+            <a:ext cx="11249464" cy="2259229"/>
           </a:xfrm>
           <a:prstGeom prst="rect">
             <a:avLst/>
@@ -6718,134 +7330,6 @@
           </a:p>
         </p:txBody>
       </p:sp>
-      <p:sp>
-        <p:nvSpPr>
-          <p:cNvPr id="3" name="CaixaDeTexto 2">
-            <a:extLst>
-              <a:ext uri="{FF2B5EF4-FFF2-40B4-BE49-F238E27FC236}">
-                <a16:creationId xmlns:a16="http://schemas.microsoft.com/office/drawing/2014/main" id="{102B2434-5824-EA30-1C5C-E28F98C02BA9}"/>
-              </a:ext>
-            </a:extLst>
-          </p:cNvPr>
-          <p:cNvSpPr txBox="1"/>
-          <p:nvPr/>
-        </p:nvSpPr>
-        <p:spPr>
-          <a:xfrm>
-            <a:off x="3098970" y="1894104"/>
-            <a:ext cx="5994059" cy="461665"/>
-          </a:xfrm>
-          <a:prstGeom prst="rect">
-            <a:avLst/>
-          </a:prstGeom>
-          <a:noFill/>
-        </p:spPr>
-        <p:txBody>
-          <a:bodyPr wrap="square" rtlCol="0">
-            <a:spAutoFit/>
-          </a:bodyPr>
-          <a:lstStyle/>
-          <a:p>
-            <a:r>
-              <a:rPr lang="en-US" sz="2400" dirty="0">
-                <a:solidFill>
-                  <a:srgbClr val="7030A0"/>
-                </a:solidFill>
-              </a:rPr>
-              <a:t>SELECT </a:t>
-            </a:r>
-            <a:r>
-              <a:rPr lang="en-US" sz="2400" dirty="0" err="1"/>
-              <a:t>atributo</a:t>
-            </a:r>
-            <a:r>
-              <a:rPr lang="en-US" sz="2400" dirty="0"/>
-              <a:t>(s)</a:t>
-            </a:r>
-            <a:r>
-              <a:rPr lang="en-US" sz="2400" dirty="0">
-                <a:solidFill>
-                  <a:srgbClr val="7030A0"/>
-                </a:solidFill>
-              </a:rPr>
-              <a:t> FROM</a:t>
-            </a:r>
-            <a:r>
-              <a:rPr lang="en-US" sz="2400" dirty="0"/>
-              <a:t> </a:t>
-            </a:r>
-            <a:r>
-              <a:rPr lang="en-US" sz="2400" dirty="0" err="1"/>
-              <a:t>tabela</a:t>
-            </a:r>
-            <a:r>
-              <a:rPr lang="en-US" sz="2400" dirty="0"/>
-              <a:t> </a:t>
-            </a:r>
-            <a:r>
-              <a:rPr lang="en-US" sz="2400" dirty="0">
-                <a:solidFill>
-                  <a:srgbClr val="7030A0"/>
-                </a:solidFill>
-              </a:rPr>
-              <a:t>WHERE</a:t>
-            </a:r>
-            <a:r>
-              <a:rPr lang="en-US" sz="2400" dirty="0"/>
-              <a:t> </a:t>
-            </a:r>
-            <a:r>
-              <a:rPr lang="en-US" sz="2400" dirty="0" err="1"/>
-              <a:t>lógica</a:t>
-            </a:r>
-            <a:r>
-              <a:rPr lang="en-US" sz="2400" dirty="0"/>
-              <a:t>;</a:t>
-            </a:r>
-            <a:endParaRPr lang="pt-BR" sz="2400" dirty="0"/>
-          </a:p>
-        </p:txBody>
-      </p:sp>
-      <p:sp>
-        <p:nvSpPr>
-          <p:cNvPr id="4" name="CaixaDeTexto 3">
-            <a:extLst>
-              <a:ext uri="{FF2B5EF4-FFF2-40B4-BE49-F238E27FC236}">
-                <a16:creationId xmlns:a16="http://schemas.microsoft.com/office/drawing/2014/main" id="{22901F1E-039F-7BF8-CB2E-D9A050361F3B}"/>
-              </a:ext>
-            </a:extLst>
-          </p:cNvPr>
-          <p:cNvSpPr txBox="1"/>
-          <p:nvPr/>
-        </p:nvSpPr>
-        <p:spPr>
-          <a:xfrm>
-            <a:off x="4002696" y="1182497"/>
-            <a:ext cx="4186606" cy="523220"/>
-          </a:xfrm>
-          <a:prstGeom prst="rect">
-            <a:avLst/>
-          </a:prstGeom>
-          <a:noFill/>
-        </p:spPr>
-        <p:txBody>
-          <a:bodyPr wrap="square" rtlCol="0">
-            <a:spAutoFit/>
-          </a:bodyPr>
-          <a:lstStyle/>
-          <a:p>
-            <a:r>
-              <a:rPr lang="en-US" sz="2800" dirty="0" err="1"/>
-              <a:t>Busca</a:t>
-            </a:r>
-            <a:r>
-              <a:rPr lang="en-US" sz="2800" dirty="0"/>
-              <a:t> / Consulta dos Dados</a:t>
-            </a:r>
-            <a:endParaRPr lang="pt-BR" sz="2800" dirty="0"/>
-          </a:p>
-        </p:txBody>
-      </p:sp>
       <p:pic>
         <p:nvPicPr>
           <p:cNvPr id="10" name="Imagem 9">
@@ -6870,6 +7354,42 @@
           <a:xfrm>
             <a:off x="2880864" y="2711924"/>
             <a:ext cx="6430272" cy="3296110"/>
+          </a:xfrm>
+          <a:prstGeom prst="rect">
+            <a:avLst/>
+          </a:prstGeom>
+        </p:spPr>
+      </p:pic>
+      <p:pic>
+        <p:nvPicPr>
+          <p:cNvPr id="7" name="Imagem 6">
+            <a:extLst>
+              <a:ext uri="{FF2B5EF4-FFF2-40B4-BE49-F238E27FC236}">
+                <a16:creationId xmlns:a16="http://schemas.microsoft.com/office/drawing/2014/main" id="{EB90C26E-80DB-1A62-54B6-29563B4B20D3}"/>
+              </a:ext>
+            </a:extLst>
+          </p:cNvPr>
+          <p:cNvPicPr>
+            <a:picLocks noChangeAspect="1"/>
+          </p:cNvPicPr>
+          <p:nvPr/>
+        </p:nvPicPr>
+        <p:blipFill>
+          <a:blip r:embed="rId4">
+            <a:extLst>
+              <a:ext uri="{28A0092B-C50C-407E-A947-70E740481C1C}">
+                <a14:useLocalDpi xmlns:a14="http://schemas.microsoft.com/office/drawing/2010/main" val="0"/>
+              </a:ext>
+            </a:extLst>
+          </a:blip>
+          <a:stretch>
+            <a:fillRect/>
+          </a:stretch>
+        </p:blipFill>
+        <p:spPr>
+          <a:xfrm>
+            <a:off x="715612" y="1048274"/>
+            <a:ext cx="10760776" cy="1441718"/>
           </a:xfrm>
           <a:prstGeom prst="rect">
             <a:avLst/>
@@ -6948,110 +7468,6 @@
           </a:prstGeom>
         </p:spPr>
       </p:pic>
-      <p:sp>
-        <p:nvSpPr>
-          <p:cNvPr id="2" name="CaixaDeTexto 1">
-            <a:extLst>
-              <a:ext uri="{FF2B5EF4-FFF2-40B4-BE49-F238E27FC236}">
-                <a16:creationId xmlns:a16="http://schemas.microsoft.com/office/drawing/2014/main" id="{0E7BF186-D8B7-E7AD-05CF-BB0B59ABF361}"/>
-              </a:ext>
-            </a:extLst>
-          </p:cNvPr>
-          <p:cNvSpPr txBox="1"/>
-          <p:nvPr/>
-        </p:nvSpPr>
-        <p:spPr>
-          <a:xfrm>
-            <a:off x="4500974" y="180011"/>
-            <a:ext cx="3190051" cy="646331"/>
-          </a:xfrm>
-          <a:prstGeom prst="rect">
-            <a:avLst/>
-          </a:prstGeom>
-          <a:noFill/>
-        </p:spPr>
-        <p:txBody>
-          <a:bodyPr wrap="square" rtlCol="0">
-            <a:spAutoFit/>
-          </a:bodyPr>
-          <a:lstStyle/>
-          <a:p>
-            <a:r>
-              <a:rPr lang="en-US" sz="3600" dirty="0"/>
-              <a:t>Busca de Dados</a:t>
-            </a:r>
-            <a:endParaRPr lang="pt-BR" sz="3600" dirty="0"/>
-          </a:p>
-        </p:txBody>
-      </p:sp>
-      <p:sp>
-        <p:nvSpPr>
-          <p:cNvPr id="3" name="CaixaDeTexto 2">
-            <a:extLst>
-              <a:ext uri="{FF2B5EF4-FFF2-40B4-BE49-F238E27FC236}">
-                <a16:creationId xmlns:a16="http://schemas.microsoft.com/office/drawing/2014/main" id="{99C6FF1B-774D-C906-EEC9-76468AE9A576}"/>
-              </a:ext>
-            </a:extLst>
-          </p:cNvPr>
-          <p:cNvSpPr txBox="1"/>
-          <p:nvPr/>
-        </p:nvSpPr>
-        <p:spPr>
-          <a:xfrm>
-            <a:off x="3440722" y="1362808"/>
-            <a:ext cx="5310554" cy="461665"/>
-          </a:xfrm>
-          <a:prstGeom prst="rect">
-            <a:avLst/>
-          </a:prstGeom>
-          <a:noFill/>
-        </p:spPr>
-        <p:txBody>
-          <a:bodyPr wrap="square" rtlCol="0">
-            <a:spAutoFit/>
-          </a:bodyPr>
-          <a:lstStyle/>
-          <a:p>
-            <a:r>
-              <a:rPr lang="en-US" sz="2400" dirty="0" err="1"/>
-              <a:t>Buscando</a:t>
-            </a:r>
-            <a:r>
-              <a:rPr lang="en-US" sz="2400" dirty="0"/>
-              <a:t> </a:t>
-            </a:r>
-            <a:r>
-              <a:rPr lang="en-US" sz="2400" dirty="0" err="1"/>
-              <a:t>todos</a:t>
-            </a:r>
-            <a:r>
-              <a:rPr lang="en-US" sz="2400" dirty="0"/>
-              <a:t> </a:t>
-            </a:r>
-            <a:r>
-              <a:rPr lang="en-US" sz="2400" dirty="0" err="1"/>
-              <a:t>os</a:t>
-            </a:r>
-            <a:r>
-              <a:rPr lang="en-US" sz="2400" dirty="0"/>
-              <a:t> dados de </a:t>
-            </a:r>
-            <a:r>
-              <a:rPr lang="en-US" sz="2400" dirty="0" err="1"/>
-              <a:t>uma</a:t>
-            </a:r>
-            <a:r>
-              <a:rPr lang="en-US" sz="2400" dirty="0"/>
-              <a:t> </a:t>
-            </a:r>
-            <a:r>
-              <a:rPr lang="en-US" sz="2400" dirty="0" err="1"/>
-              <a:t>tabela</a:t>
-            </a:r>
-            <a:endParaRPr lang="pt-BR" sz="2400" dirty="0"/>
-          </a:p>
-        </p:txBody>
-      </p:sp>
       <p:pic>
         <p:nvPicPr>
           <p:cNvPr id="6" name="Imagem 5">
@@ -7084,10 +7500,10 @@
       </p:pic>
       <p:pic>
         <p:nvPicPr>
-          <p:cNvPr id="7" name="Imagem 6" descr="Uma imagem contendo Ícone&#10;&#10;O conteúdo gerado por IA pode estar incorreto.">
-            <a:extLst>
-              <a:ext uri="{FF2B5EF4-FFF2-40B4-BE49-F238E27FC236}">
-                <a16:creationId xmlns:a16="http://schemas.microsoft.com/office/drawing/2014/main" id="{6BA7E1F0-BD1E-D6E4-AEA5-0998B0C3B446}"/>
+          <p:cNvPr id="8" name="Imagem 7">
+            <a:extLst>
+              <a:ext uri="{FF2B5EF4-FFF2-40B4-BE49-F238E27FC236}">
+                <a16:creationId xmlns:a16="http://schemas.microsoft.com/office/drawing/2014/main" id="{40C80E71-5F31-F762-B42D-F7E02C28F842}"/>
               </a:ext>
             </a:extLst>
           </p:cNvPr>
@@ -7097,65 +7513,67 @@
           <p:nvPr/>
         </p:nvPicPr>
         <p:blipFill>
-          <a:blip r:embed="rId4"/>
+          <a:blip r:embed="rId4">
+            <a:extLst>
+              <a:ext uri="{28A0092B-C50C-407E-A947-70E740481C1C}">
+                <a14:useLocalDpi xmlns:a14="http://schemas.microsoft.com/office/drawing/2010/main" val="0"/>
+              </a:ext>
+            </a:extLst>
+          </a:blip>
           <a:stretch>
             <a:fillRect/>
           </a:stretch>
         </p:blipFill>
         <p:spPr>
           <a:xfrm>
-            <a:off x="1772007" y="2360939"/>
-            <a:ext cx="8647984" cy="1094682"/>
+            <a:off x="1853780" y="1310284"/>
+            <a:ext cx="8484438" cy="2233016"/>
           </a:xfrm>
           <a:prstGeom prst="rect">
             <a:avLst/>
           </a:prstGeom>
         </p:spPr>
       </p:pic>
-      <p:cxnSp>
-        <p:nvCxnSpPr>
-          <p:cNvPr id="10" name="Conector: Curvo 9">
-            <a:extLst>
-              <a:ext uri="{FF2B5EF4-FFF2-40B4-BE49-F238E27FC236}">
-                <a16:creationId xmlns:a16="http://schemas.microsoft.com/office/drawing/2014/main" id="{5F3203F5-CCC8-7703-EF03-778065FE5587}"/>
-              </a:ext>
-            </a:extLst>
-          </p:cNvPr>
-          <p:cNvCxnSpPr>
-            <a:cxnSpLocks/>
-          </p:cNvCxnSpPr>
-          <p:nvPr/>
-        </p:nvCxnSpPr>
-        <p:spPr>
-          <a:xfrm rot="5400000" flipH="1" flipV="1">
-            <a:off x="4375078" y="1845551"/>
-            <a:ext cx="719158" cy="677007"/>
-          </a:xfrm>
-          <a:prstGeom prst="curvedConnector3">
-            <a:avLst>
-              <a:gd name="adj1" fmla="val 53668"/>
-            </a:avLst>
-          </a:prstGeom>
-          <a:ln>
-            <a:headEnd type="triangle"/>
-            <a:tailEnd type="triangle"/>
-          </a:ln>
-        </p:spPr>
-        <p:style>
-          <a:lnRef idx="1">
-            <a:schemeClr val="dk1"/>
-          </a:lnRef>
-          <a:fillRef idx="0">
-            <a:schemeClr val="dk1"/>
-          </a:fillRef>
-          <a:effectRef idx="0">
-            <a:schemeClr val="dk1"/>
-          </a:effectRef>
-          <a:fontRef idx="minor">
-            <a:schemeClr val="tx1"/>
-          </a:fontRef>
-        </p:style>
-      </p:cxnSp>
+      <p:sp>
+        <p:nvSpPr>
+          <p:cNvPr id="9" name="CaixaDeTexto 8">
+            <a:extLst>
+              <a:ext uri="{FF2B5EF4-FFF2-40B4-BE49-F238E27FC236}">
+                <a16:creationId xmlns:a16="http://schemas.microsoft.com/office/drawing/2014/main" id="{9749359F-7BA9-63DA-D0C5-38AFFEE264E7}"/>
+              </a:ext>
+            </a:extLst>
+          </p:cNvPr>
+          <p:cNvSpPr txBox="1"/>
+          <p:nvPr/>
+        </p:nvSpPr>
+        <p:spPr>
+          <a:xfrm>
+            <a:off x="4353749" y="180011"/>
+            <a:ext cx="3484502" cy="646331"/>
+          </a:xfrm>
+          <a:prstGeom prst="rect">
+            <a:avLst/>
+          </a:prstGeom>
+          <a:noFill/>
+        </p:spPr>
+        <p:txBody>
+          <a:bodyPr wrap="square" rtlCol="0">
+            <a:spAutoFit/>
+          </a:bodyPr>
+          <a:lstStyle/>
+          <a:p>
+            <a:r>
+              <a:rPr lang="en-US" sz="3600" dirty="0" err="1"/>
+              <a:t>Comando</a:t>
+            </a:r>
+            <a:r>
+              <a:rPr lang="en-US" sz="3600" dirty="0"/>
+              <a:t> SELECT</a:t>
+            </a:r>
+            <a:endParaRPr lang="pt-BR" sz="3600" dirty="0"/>
+          </a:p>
+        </p:txBody>
+      </p:sp>
     </p:spTree>
     <p:extLst>
       <p:ext uri="{BB962C8B-B14F-4D97-AF65-F5344CB8AC3E}">
@@ -7228,110 +7646,6 @@
           </a:prstGeom>
         </p:spPr>
       </p:pic>
-      <p:sp>
-        <p:nvSpPr>
-          <p:cNvPr id="2" name="CaixaDeTexto 1">
-            <a:extLst>
-              <a:ext uri="{FF2B5EF4-FFF2-40B4-BE49-F238E27FC236}">
-                <a16:creationId xmlns:a16="http://schemas.microsoft.com/office/drawing/2014/main" id="{DB980029-2DCE-7A9E-FAFC-00B36086534C}"/>
-              </a:ext>
-            </a:extLst>
-          </p:cNvPr>
-          <p:cNvSpPr txBox="1"/>
-          <p:nvPr/>
-        </p:nvSpPr>
-        <p:spPr>
-          <a:xfrm>
-            <a:off x="4500974" y="180011"/>
-            <a:ext cx="3190051" cy="646331"/>
-          </a:xfrm>
-          <a:prstGeom prst="rect">
-            <a:avLst/>
-          </a:prstGeom>
-          <a:noFill/>
-        </p:spPr>
-        <p:txBody>
-          <a:bodyPr wrap="square" rtlCol="0">
-            <a:spAutoFit/>
-          </a:bodyPr>
-          <a:lstStyle/>
-          <a:p>
-            <a:r>
-              <a:rPr lang="en-US" sz="3600" dirty="0"/>
-              <a:t>Busca de Dados</a:t>
-            </a:r>
-            <a:endParaRPr lang="pt-BR" sz="3600" dirty="0"/>
-          </a:p>
-        </p:txBody>
-      </p:sp>
-      <p:sp>
-        <p:nvSpPr>
-          <p:cNvPr id="3" name="CaixaDeTexto 2">
-            <a:extLst>
-              <a:ext uri="{FF2B5EF4-FFF2-40B4-BE49-F238E27FC236}">
-                <a16:creationId xmlns:a16="http://schemas.microsoft.com/office/drawing/2014/main" id="{39F67A44-AC15-B2E8-DCBA-FB96C62214CF}"/>
-              </a:ext>
-            </a:extLst>
-          </p:cNvPr>
-          <p:cNvSpPr txBox="1"/>
-          <p:nvPr/>
-        </p:nvSpPr>
-        <p:spPr>
-          <a:xfrm>
-            <a:off x="2211996" y="1349615"/>
-            <a:ext cx="7768005" cy="523220"/>
-          </a:xfrm>
-          <a:prstGeom prst="rect">
-            <a:avLst/>
-          </a:prstGeom>
-          <a:noFill/>
-        </p:spPr>
-        <p:txBody>
-          <a:bodyPr wrap="square" rtlCol="0">
-            <a:spAutoFit/>
-          </a:bodyPr>
-          <a:lstStyle/>
-          <a:p>
-            <a:r>
-              <a:rPr lang="en-US" sz="2800" dirty="0" err="1"/>
-              <a:t>Buscando</a:t>
-            </a:r>
-            <a:r>
-              <a:rPr lang="en-US" sz="2800" dirty="0"/>
-              <a:t> </a:t>
-            </a:r>
-            <a:r>
-              <a:rPr lang="en-US" sz="2800" dirty="0" err="1"/>
-              <a:t>parte</a:t>
-            </a:r>
-            <a:r>
-              <a:rPr lang="en-US" sz="2800" dirty="0"/>
-              <a:t> dos dados de </a:t>
-            </a:r>
-            <a:r>
-              <a:rPr lang="en-US" sz="2800" dirty="0" err="1"/>
-              <a:t>uma</a:t>
-            </a:r>
-            <a:r>
-              <a:rPr lang="en-US" sz="2800" dirty="0"/>
-              <a:t> </a:t>
-            </a:r>
-            <a:r>
-              <a:rPr lang="en-US" sz="2800" dirty="0" err="1"/>
-              <a:t>tabela</a:t>
-            </a:r>
-            <a:r>
-              <a:rPr lang="en-US" sz="2800" dirty="0"/>
-              <a:t> com </a:t>
-            </a:r>
-            <a:r>
-              <a:rPr lang="en-US" sz="2800" dirty="0" err="1"/>
-              <a:t>lógica</a:t>
-            </a:r>
-            <a:endParaRPr lang="pt-BR" sz="2800" dirty="0"/>
-          </a:p>
-        </p:txBody>
-      </p:sp>
       <p:pic>
         <p:nvPicPr>
           <p:cNvPr id="8" name="Imagem 7">
@@ -7364,10 +7678,10 @@
       </p:pic>
       <p:pic>
         <p:nvPicPr>
-          <p:cNvPr id="7" name="Imagem 6">
-            <a:extLst>
-              <a:ext uri="{FF2B5EF4-FFF2-40B4-BE49-F238E27FC236}">
-                <a16:creationId xmlns:a16="http://schemas.microsoft.com/office/drawing/2014/main" id="{5E5E58CB-DA6D-0274-313C-D9B117203CAF}"/>
+          <p:cNvPr id="6" name="Imagem 5">
+            <a:extLst>
+              <a:ext uri="{FF2B5EF4-FFF2-40B4-BE49-F238E27FC236}">
+                <a16:creationId xmlns:a16="http://schemas.microsoft.com/office/drawing/2014/main" id="{572A379F-3640-985F-87BA-AB5B04784806}"/>
               </a:ext>
             </a:extLst>
           </p:cNvPr>
@@ -7377,21 +7691,67 @@
           <p:nvPr/>
         </p:nvPicPr>
         <p:blipFill>
-          <a:blip r:embed="rId4"/>
+          <a:blip r:embed="rId4">
+            <a:extLst>
+              <a:ext uri="{28A0092B-C50C-407E-A947-70E740481C1C}">
+                <a14:useLocalDpi xmlns:a14="http://schemas.microsoft.com/office/drawing/2010/main" val="0"/>
+              </a:ext>
+            </a:extLst>
+          </a:blip>
           <a:stretch>
             <a:fillRect/>
           </a:stretch>
         </p:blipFill>
         <p:spPr>
           <a:xfrm>
-            <a:off x="599307" y="2396109"/>
-            <a:ext cx="10993384" cy="533474"/>
+            <a:off x="1004176" y="1159172"/>
+            <a:ext cx="10183646" cy="1952898"/>
           </a:xfrm>
           <a:prstGeom prst="rect">
             <a:avLst/>
           </a:prstGeom>
         </p:spPr>
       </p:pic>
+      <p:sp>
+        <p:nvSpPr>
+          <p:cNvPr id="9" name="CaixaDeTexto 8">
+            <a:extLst>
+              <a:ext uri="{FF2B5EF4-FFF2-40B4-BE49-F238E27FC236}">
+                <a16:creationId xmlns:a16="http://schemas.microsoft.com/office/drawing/2014/main" id="{2BF8936E-41B8-3F6C-1AB5-C49E98577D9C}"/>
+              </a:ext>
+            </a:extLst>
+          </p:cNvPr>
+          <p:cNvSpPr txBox="1"/>
+          <p:nvPr/>
+        </p:nvSpPr>
+        <p:spPr>
+          <a:xfrm>
+            <a:off x="4353749" y="180011"/>
+            <a:ext cx="3484502" cy="646331"/>
+          </a:xfrm>
+          <a:prstGeom prst="rect">
+            <a:avLst/>
+          </a:prstGeom>
+          <a:noFill/>
+        </p:spPr>
+        <p:txBody>
+          <a:bodyPr wrap="square" rtlCol="0">
+            <a:spAutoFit/>
+          </a:bodyPr>
+          <a:lstStyle/>
+          <a:p>
+            <a:r>
+              <a:rPr lang="en-US" sz="3600" dirty="0" err="1"/>
+              <a:t>Comando</a:t>
+            </a:r>
+            <a:r>
+              <a:rPr lang="en-US" sz="3600" dirty="0"/>
+              <a:t> SELECT</a:t>
+            </a:r>
+            <a:endParaRPr lang="pt-BR" sz="3600" dirty="0"/>
+          </a:p>
+        </p:txBody>
+      </p:sp>
     </p:spTree>
     <p:extLst>
       <p:ext uri="{BB962C8B-B14F-4D97-AF65-F5344CB8AC3E}">

</xml_diff>